<commit_message>
Add File to Gitignore
</commit_message>
<xml_diff>
--- a/HDM Data Science v0226.pptx
+++ b/HDM Data Science v0226.pptx
@@ -1085,7 +1085,7 @@
           <a:p>
             <a:fld id="{9B39517B-FB26-4CEE-A0CD-05465EABC2B5}" type="datetimeFigureOut">
               <a:rPr lang="de-DE" smtClean="0"/>
-              <a:t>04.03.2023</a:t>
+              <a:t>05.03.2023</a:t>
             </a:fld>
             <a:endParaRPr lang="de-DE"/>
           </a:p>
@@ -3162,7 +3162,7 @@
           <a:p>
             <a:fld id="{ED291B17-9318-49DB-B28B-6E5994AE9581}" type="datetime1">
               <a:rPr lang="en-US" smtClean="0"/>
-              <a:t>3/4/2023</a:t>
+              <a:t>3/5/2023</a:t>
             </a:fld>
             <a:endParaRPr lang="en-US" dirty="0"/>
           </a:p>
@@ -3365,7 +3365,7 @@
           <a:p>
             <a:fld id="{2CED4963-E985-44C4-B8C4-FDD613B7C2F8}" type="datetime1">
               <a:rPr lang="en-US" smtClean="0"/>
-              <a:t>3/4/2023</a:t>
+              <a:t>3/5/2023</a:t>
             </a:fld>
             <a:endParaRPr lang="en-US" dirty="0"/>
           </a:p>
@@ -3727,7 +3727,7 @@
           <a:p>
             <a:fld id="{ED291B17-9318-49DB-B28B-6E5994AE9581}" type="datetime1">
               <a:rPr lang="en-US" smtClean="0"/>
-              <a:t>3/4/2023</a:t>
+              <a:t>3/5/2023</a:t>
             </a:fld>
             <a:endParaRPr lang="en-US" dirty="0"/>
           </a:p>
@@ -3925,7 +3925,7 @@
           <a:p>
             <a:fld id="{78DD82B9-B8EE-4375-B6FF-88FA6ABB15D9}" type="datetime1">
               <a:rPr lang="en-US" smtClean="0"/>
-              <a:t>3/4/2023</a:t>
+              <a:t>3/5/2023</a:t>
             </a:fld>
             <a:endParaRPr lang="en-US" dirty="0"/>
           </a:p>
@@ -4237,7 +4237,7 @@
           <a:p>
             <a:fld id="{B2497495-0637-405E-AE64-5CC7506D51F5}" type="datetime1">
               <a:rPr lang="en-US" smtClean="0"/>
-              <a:t>3/4/2023</a:t>
+              <a:t>3/5/2023</a:t>
             </a:fld>
             <a:endParaRPr lang="en-US" dirty="0"/>
           </a:p>
@@ -4490,7 +4490,7 @@
           <a:p>
             <a:fld id="{7BFFD690-9426-415D-8B65-26881E07B2D4}" type="datetime1">
               <a:rPr lang="en-US" smtClean="0"/>
-              <a:t>3/4/2023</a:t>
+              <a:t>3/5/2023</a:t>
             </a:fld>
             <a:endParaRPr lang="en-US" dirty="0"/>
           </a:p>
@@ -4912,7 +4912,7 @@
           <a:p>
             <a:fld id="{04C4989A-474C-40DE-95B9-011C28B71673}" type="datetime1">
               <a:rPr lang="en-US" smtClean="0"/>
-              <a:t>3/4/2023</a:t>
+              <a:t>3/5/2023</a:t>
             </a:fld>
             <a:endParaRPr lang="en-US" dirty="0"/>
           </a:p>
@@ -5035,7 +5035,7 @@
           <a:p>
             <a:fld id="{5DB4ED54-5B5E-4A04-93D3-5772E3CE3818}" type="datetime1">
               <a:rPr lang="en-US" smtClean="0"/>
-              <a:t>3/4/2023</a:t>
+              <a:t>3/5/2023</a:t>
             </a:fld>
             <a:endParaRPr lang="en-US" dirty="0"/>
           </a:p>
@@ -5130,7 +5130,7 @@
           <a:p>
             <a:fld id="{4EDE50D6-574B-40AF-946F-D52A04ADE379}" type="datetime1">
               <a:rPr lang="en-US" smtClean="0"/>
-              <a:t>3/4/2023</a:t>
+              <a:t>3/5/2023</a:t>
             </a:fld>
             <a:endParaRPr lang="en-US" dirty="0"/>
           </a:p>
@@ -5507,7 +5507,7 @@
           <a:p>
             <a:fld id="{D82884F1-FFEA-405F-9602-3DCA865EDA4E}" type="datetime1">
               <a:rPr lang="en-US" smtClean="0"/>
-              <a:t>3/4/2023</a:t>
+              <a:t>3/5/2023</a:t>
             </a:fld>
             <a:endParaRPr lang="en-US" dirty="0"/>
           </a:p>
@@ -5800,7 +5800,7 @@
           <a:p>
             <a:fld id="{7E18DB4A-8810-4A10-AD5C-D5E2C667F5B3}" type="datetime1">
               <a:rPr lang="en-US" smtClean="0"/>
-              <a:t>3/4/2023</a:t>
+              <a:t>3/5/2023</a:t>
             </a:fld>
             <a:endParaRPr lang="en-US" dirty="0"/>
           </a:p>
@@ -6015,7 +6015,7 @@
           <a:p>
             <a:fld id="{ED291B17-9318-49DB-B28B-6E5994AE9581}" type="datetime1">
               <a:rPr lang="en-US" smtClean="0"/>
-              <a:t>3/4/2023</a:t>
+              <a:t>3/5/2023</a:t>
             </a:fld>
             <a:endParaRPr lang="en-US" dirty="0"/>
           </a:p>
@@ -7203,8 +7203,13 @@
           <a:p>
             <a:r>
               <a:rPr lang="en-US" dirty="0"/>
-              <a:t>FP Growth – Process</a:t>
-            </a:r>
+              <a:t>FP Growth – </a:t>
+            </a:r>
+            <a:r>
+              <a:rPr lang="en-US" dirty="0" err="1"/>
+              <a:t>ProcesS</a:t>
+            </a:r>
+            <a:endParaRPr lang="en-US" dirty="0"/>
           </a:p>
         </p:txBody>
       </p:sp>
@@ -7232,7 +7237,7 @@
         </p:blipFill>
         <p:spPr>
           <a:xfrm>
-            <a:off x="581025" y="2698610"/>
+            <a:off x="526882" y="2239937"/>
             <a:ext cx="11029950" cy="2919693"/>
           </a:xfrm>
           <a:prstGeom prst="rect">

</xml_diff>

<commit_message>
Update HDM Data Science v0226.pptx
add Reflection to PPT
</commit_message>
<xml_diff>
--- a/HDM Data Science v0226.pptx
+++ b/HDM Data Science v0226.pptx
@@ -5,25 +5,32 @@
     <p:sldMasterId id="2147483738" r:id="rId1"/>
   </p:sldMasterIdLst>
   <p:notesMasterIdLst>
-    <p:notesMasterId r:id="rId18"/>
+    <p:notesMasterId r:id="rId25"/>
   </p:notesMasterIdLst>
   <p:sldIdLst>
     <p:sldId id="256" r:id="rId2"/>
     <p:sldId id="257" r:id="rId3"/>
-    <p:sldId id="261" r:id="rId4"/>
-    <p:sldId id="258" r:id="rId5"/>
-    <p:sldId id="262" r:id="rId6"/>
-    <p:sldId id="260" r:id="rId7"/>
-    <p:sldId id="259" r:id="rId8"/>
-    <p:sldId id="265" r:id="rId9"/>
-    <p:sldId id="263" r:id="rId10"/>
-    <p:sldId id="264" r:id="rId11"/>
-    <p:sldId id="266" r:id="rId12"/>
-    <p:sldId id="267" r:id="rId13"/>
-    <p:sldId id="268" r:id="rId14"/>
-    <p:sldId id="270" r:id="rId15"/>
-    <p:sldId id="269" r:id="rId16"/>
-    <p:sldId id="271" r:id="rId17"/>
+    <p:sldId id="272" r:id="rId4"/>
+    <p:sldId id="273" r:id="rId5"/>
+    <p:sldId id="261" r:id="rId6"/>
+    <p:sldId id="258" r:id="rId7"/>
+    <p:sldId id="262" r:id="rId8"/>
+    <p:sldId id="260" r:id="rId9"/>
+    <p:sldId id="259" r:id="rId10"/>
+    <p:sldId id="265" r:id="rId11"/>
+    <p:sldId id="263" r:id="rId12"/>
+    <p:sldId id="264" r:id="rId13"/>
+    <p:sldId id="266" r:id="rId14"/>
+    <p:sldId id="267" r:id="rId15"/>
+    <p:sldId id="268" r:id="rId16"/>
+    <p:sldId id="270" r:id="rId17"/>
+    <p:sldId id="269" r:id="rId18"/>
+    <p:sldId id="271" r:id="rId19"/>
+    <p:sldId id="274" r:id="rId20"/>
+    <p:sldId id="275" r:id="rId21"/>
+    <p:sldId id="276" r:id="rId22"/>
+    <p:sldId id="277" r:id="rId23"/>
+    <p:sldId id="278" r:id="rId24"/>
   </p:sldIdLst>
   <p:sldSz cx="12192000" cy="6858000"/>
   <p:notesSz cx="6858000" cy="9144000"/>
@@ -1003,6 +1010,1435 @@
 </pc:chgInfo>
 </file>
 
+<file path=ppt/charts/chart1.xml><?xml version="1.0" encoding="utf-8"?>
+<c:chartSpace xmlns:c="http://schemas.openxmlformats.org/drawingml/2006/chart" xmlns:a="http://schemas.openxmlformats.org/drawingml/2006/main" xmlns:r="http://schemas.openxmlformats.org/officeDocument/2006/relationships" xmlns:c16r2="http://schemas.microsoft.com/office/drawing/2015/06/chart">
+  <c:date1904 val="0"/>
+  <c:lang val="de-DE"/>
+  <c:roundedCorners val="0"/>
+  <mc:AlternateContent xmlns:mc="http://schemas.openxmlformats.org/markup-compatibility/2006">
+    <mc:Choice xmlns:c14="http://schemas.microsoft.com/office/drawing/2007/8/2/chart" Requires="c14">
+      <c14:style val="102"/>
+    </mc:Choice>
+    <mc:Fallback>
+      <c:style val="2"/>
+    </mc:Fallback>
+  </mc:AlternateContent>
+  <c:chart>
+    <c:title>
+      <c:tx>
+        <c:rich>
+          <a:bodyPr rot="0" spcFirstLastPara="1" vertOverflow="ellipsis" vert="horz" wrap="square" anchor="ctr" anchorCtr="1"/>
+          <a:lstStyle/>
+          <a:p>
+            <a:pPr>
+              <a:defRPr sz="1862" b="0" i="0" u="none" strike="noStrike" kern="1200" spc="0" baseline="0">
+                <a:solidFill>
+                  <a:schemeClr val="tx1">
+                    <a:lumMod val="65000"/>
+                    <a:lumOff val="35000"/>
+                  </a:schemeClr>
+                </a:solidFill>
+                <a:latin typeface="+mn-lt"/>
+                <a:ea typeface="+mn-ea"/>
+                <a:cs typeface="+mn-cs"/>
+              </a:defRPr>
+            </a:pPr>
+            <a:r>
+              <a:rPr lang="de-DE"/>
+              <a:t>Model comparison </a:t>
+            </a:r>
+          </a:p>
+        </c:rich>
+      </c:tx>
+      <c:layout/>
+      <c:overlay val="0"/>
+      <c:spPr>
+        <a:noFill/>
+        <a:ln>
+          <a:noFill/>
+        </a:ln>
+        <a:effectLst/>
+      </c:spPr>
+      <c:txPr>
+        <a:bodyPr rot="0" spcFirstLastPara="1" vertOverflow="ellipsis" vert="horz" wrap="square" anchor="ctr" anchorCtr="1"/>
+        <a:lstStyle/>
+        <a:p>
+          <a:pPr>
+            <a:defRPr sz="1862" b="0" i="0" u="none" strike="noStrike" kern="1200" spc="0" baseline="0">
+              <a:solidFill>
+                <a:schemeClr val="tx1">
+                  <a:lumMod val="65000"/>
+                  <a:lumOff val="35000"/>
+                </a:schemeClr>
+              </a:solidFill>
+              <a:latin typeface="+mn-lt"/>
+              <a:ea typeface="+mn-ea"/>
+              <a:cs typeface="+mn-cs"/>
+            </a:defRPr>
+          </a:pPr>
+          <a:endParaRPr lang="de-DE"/>
+        </a:p>
+      </c:txPr>
+    </c:title>
+    <c:autoTitleDeleted val="0"/>
+    <c:plotArea>
+      <c:layout/>
+      <c:barChart>
+        <c:barDir val="col"/>
+        <c:grouping val="clustered"/>
+        <c:varyColors val="0"/>
+        <c:ser>
+          <c:idx val="0"/>
+          <c:order val="0"/>
+          <c:tx>
+            <c:strRef>
+              <c:f>Tabelle1!$B$1</c:f>
+              <c:strCache>
+                <c:ptCount val="1"/>
+                <c:pt idx="0">
+                  <c:v>KNN</c:v>
+                </c:pt>
+              </c:strCache>
+            </c:strRef>
+          </c:tx>
+          <c:spPr>
+            <a:solidFill>
+              <a:schemeClr val="accent1"/>
+            </a:solidFill>
+            <a:ln>
+              <a:noFill/>
+            </a:ln>
+            <a:effectLst/>
+          </c:spPr>
+          <c:invertIfNegative val="0"/>
+          <c:dLbls>
+            <c:spPr>
+              <a:noFill/>
+              <a:ln>
+                <a:noFill/>
+              </a:ln>
+              <a:effectLst/>
+            </c:spPr>
+            <c:txPr>
+              <a:bodyPr rot="0" spcFirstLastPara="1" vertOverflow="ellipsis" vert="horz" wrap="square" lIns="38100" tIns="19050" rIns="38100" bIns="19050" anchor="ctr" anchorCtr="1">
+                <a:spAutoFit/>
+              </a:bodyPr>
+              <a:lstStyle/>
+              <a:p>
+                <a:pPr>
+                  <a:defRPr sz="1197" b="0" i="0" u="none" strike="noStrike" kern="1200" baseline="0">
+                    <a:solidFill>
+                      <a:schemeClr val="tx1">
+                        <a:lumMod val="75000"/>
+                        <a:lumOff val="25000"/>
+                      </a:schemeClr>
+                    </a:solidFill>
+                    <a:latin typeface="+mn-lt"/>
+                    <a:ea typeface="+mn-ea"/>
+                    <a:cs typeface="+mn-cs"/>
+                  </a:defRPr>
+                </a:pPr>
+                <a:endParaRPr lang="de-DE"/>
+              </a:p>
+            </c:txPr>
+            <c:dLblPos val="outEnd"/>
+            <c:showLegendKey val="0"/>
+            <c:showVal val="1"/>
+            <c:showCatName val="0"/>
+            <c:showSerName val="0"/>
+            <c:showPercent val="0"/>
+            <c:showBubbleSize val="0"/>
+            <c:showLeaderLines val="0"/>
+            <c:extLst>
+              <c:ext xmlns:c15="http://schemas.microsoft.com/office/drawing/2012/chart" uri="{CE6537A1-D6FC-4f65-9D91-7224C49458BB}">
+                <c15:layout/>
+                <c15:showLeaderLines val="1"/>
+                <c15:leaderLines>
+                  <c:spPr>
+                    <a:ln w="9525" cap="flat" cmpd="sng" algn="ctr">
+                      <a:solidFill>
+                        <a:schemeClr val="tx1">
+                          <a:lumMod val="35000"/>
+                          <a:lumOff val="65000"/>
+                        </a:schemeClr>
+                      </a:solidFill>
+                      <a:round/>
+                    </a:ln>
+                    <a:effectLst/>
+                  </c:spPr>
+                </c15:leaderLines>
+              </c:ext>
+            </c:extLst>
+          </c:dLbls>
+          <c:cat>
+            <c:strRef>
+              <c:f>Tabelle1!$A$2:$A$4</c:f>
+              <c:strCache>
+                <c:ptCount val="3"/>
+                <c:pt idx="0">
+                  <c:v>Accuracy</c:v>
+                </c:pt>
+                <c:pt idx="1">
+                  <c:v>Precision</c:v>
+                </c:pt>
+                <c:pt idx="2">
+                  <c:v>Recall</c:v>
+                </c:pt>
+              </c:strCache>
+            </c:strRef>
+          </c:cat>
+          <c:val>
+            <c:numRef>
+              <c:f>Tabelle1!$B$2:$B$4</c:f>
+              <c:numCache>
+                <c:formatCode>0.00%</c:formatCode>
+                <c:ptCount val="3"/>
+                <c:pt idx="0">
+                  <c:v>0.7389</c:v>
+                </c:pt>
+                <c:pt idx="1">
+                  <c:v>0.80520000000000003</c:v>
+                </c:pt>
+                <c:pt idx="2">
+                  <c:v>0.62160000000000004</c:v>
+                </c:pt>
+              </c:numCache>
+            </c:numRef>
+          </c:val>
+          <c:extLst>
+            <c:ext xmlns:c16="http://schemas.microsoft.com/office/drawing/2014/chart" uri="{C3380CC4-5D6E-409C-BE32-E72D297353CC}">
+              <c16:uniqueId val="{00000000-CB1C-4803-8449-D9D4C366A9FF}"/>
+            </c:ext>
+          </c:extLst>
+        </c:ser>
+        <c:ser>
+          <c:idx val="1"/>
+          <c:order val="1"/>
+          <c:tx>
+            <c:strRef>
+              <c:f>Tabelle1!$C$1</c:f>
+              <c:strCache>
+                <c:ptCount val="1"/>
+                <c:pt idx="0">
+                  <c:v>Log. Regression</c:v>
+                </c:pt>
+              </c:strCache>
+            </c:strRef>
+          </c:tx>
+          <c:spPr>
+            <a:solidFill>
+              <a:schemeClr val="accent3"/>
+            </a:solidFill>
+            <a:ln>
+              <a:noFill/>
+            </a:ln>
+            <a:effectLst/>
+          </c:spPr>
+          <c:invertIfNegative val="0"/>
+          <c:dLbls>
+            <c:spPr>
+              <a:noFill/>
+              <a:ln>
+                <a:noFill/>
+              </a:ln>
+              <a:effectLst/>
+            </c:spPr>
+            <c:txPr>
+              <a:bodyPr rot="0" spcFirstLastPara="1" vertOverflow="ellipsis" vert="horz" wrap="square" lIns="38100" tIns="19050" rIns="38100" bIns="19050" anchor="ctr" anchorCtr="1">
+                <a:spAutoFit/>
+              </a:bodyPr>
+              <a:lstStyle/>
+              <a:p>
+                <a:pPr>
+                  <a:defRPr sz="1197" b="0" i="0" u="none" strike="noStrike" kern="1200" baseline="0">
+                    <a:solidFill>
+                      <a:schemeClr val="tx1">
+                        <a:lumMod val="75000"/>
+                        <a:lumOff val="25000"/>
+                      </a:schemeClr>
+                    </a:solidFill>
+                    <a:latin typeface="+mn-lt"/>
+                    <a:ea typeface="+mn-ea"/>
+                    <a:cs typeface="+mn-cs"/>
+                  </a:defRPr>
+                </a:pPr>
+                <a:endParaRPr lang="de-DE"/>
+              </a:p>
+            </c:txPr>
+            <c:dLblPos val="outEnd"/>
+            <c:showLegendKey val="0"/>
+            <c:showVal val="1"/>
+            <c:showCatName val="0"/>
+            <c:showSerName val="0"/>
+            <c:showPercent val="0"/>
+            <c:showBubbleSize val="0"/>
+            <c:showLeaderLines val="0"/>
+            <c:extLst>
+              <c:ext xmlns:c15="http://schemas.microsoft.com/office/drawing/2012/chart" uri="{CE6537A1-D6FC-4f65-9D91-7224C49458BB}">
+                <c15:layout/>
+                <c15:showLeaderLines val="1"/>
+                <c15:leaderLines>
+                  <c:spPr>
+                    <a:ln w="9525" cap="flat" cmpd="sng" algn="ctr">
+                      <a:solidFill>
+                        <a:schemeClr val="tx1">
+                          <a:lumMod val="35000"/>
+                          <a:lumOff val="65000"/>
+                        </a:schemeClr>
+                      </a:solidFill>
+                      <a:round/>
+                    </a:ln>
+                    <a:effectLst/>
+                  </c:spPr>
+                </c15:leaderLines>
+              </c:ext>
+            </c:extLst>
+          </c:dLbls>
+          <c:cat>
+            <c:strRef>
+              <c:f>Tabelle1!$A$2:$A$4</c:f>
+              <c:strCache>
+                <c:ptCount val="3"/>
+                <c:pt idx="0">
+                  <c:v>Accuracy</c:v>
+                </c:pt>
+                <c:pt idx="1">
+                  <c:v>Precision</c:v>
+                </c:pt>
+                <c:pt idx="2">
+                  <c:v>Recall</c:v>
+                </c:pt>
+              </c:strCache>
+            </c:strRef>
+          </c:cat>
+          <c:val>
+            <c:numRef>
+              <c:f>Tabelle1!$C$2:$C$4</c:f>
+              <c:numCache>
+                <c:formatCode>0.00%</c:formatCode>
+                <c:ptCount val="3"/>
+                <c:pt idx="0">
+                  <c:v>0.58250000000000002</c:v>
+                </c:pt>
+                <c:pt idx="1">
+                  <c:v>0.57779999999999998</c:v>
+                </c:pt>
+                <c:pt idx="2">
+                  <c:v>0.57389999999999997</c:v>
+                </c:pt>
+              </c:numCache>
+            </c:numRef>
+          </c:val>
+          <c:extLst>
+            <c:ext xmlns:c16="http://schemas.microsoft.com/office/drawing/2014/chart" uri="{C3380CC4-5D6E-409C-BE32-E72D297353CC}">
+              <c16:uniqueId val="{00000001-CB1C-4803-8449-D9D4C366A9FF}"/>
+            </c:ext>
+          </c:extLst>
+        </c:ser>
+        <c:ser>
+          <c:idx val="2"/>
+          <c:order val="2"/>
+          <c:tx>
+            <c:strRef>
+              <c:f>Tabelle1!$D$1</c:f>
+              <c:strCache>
+                <c:ptCount val="1"/>
+                <c:pt idx="0">
+                  <c:v>Random Forest</c:v>
+                </c:pt>
+              </c:strCache>
+            </c:strRef>
+          </c:tx>
+          <c:spPr>
+            <a:solidFill>
+              <a:schemeClr val="accent5"/>
+            </a:solidFill>
+            <a:ln>
+              <a:noFill/>
+            </a:ln>
+            <a:effectLst/>
+          </c:spPr>
+          <c:invertIfNegative val="0"/>
+          <c:dLbls>
+            <c:spPr>
+              <a:noFill/>
+              <a:ln>
+                <a:noFill/>
+              </a:ln>
+              <a:effectLst/>
+            </c:spPr>
+            <c:txPr>
+              <a:bodyPr rot="0" spcFirstLastPara="1" vertOverflow="ellipsis" vert="horz" wrap="square" lIns="38100" tIns="19050" rIns="38100" bIns="19050" anchor="ctr" anchorCtr="1">
+                <a:spAutoFit/>
+              </a:bodyPr>
+              <a:lstStyle/>
+              <a:p>
+                <a:pPr>
+                  <a:defRPr sz="1197" b="0" i="0" u="none" strike="noStrike" kern="1200" baseline="0">
+                    <a:solidFill>
+                      <a:schemeClr val="tx1">
+                        <a:lumMod val="75000"/>
+                        <a:lumOff val="25000"/>
+                      </a:schemeClr>
+                    </a:solidFill>
+                    <a:latin typeface="+mn-lt"/>
+                    <a:ea typeface="+mn-ea"/>
+                    <a:cs typeface="+mn-cs"/>
+                  </a:defRPr>
+                </a:pPr>
+                <a:endParaRPr lang="de-DE"/>
+              </a:p>
+            </c:txPr>
+            <c:dLblPos val="outEnd"/>
+            <c:showLegendKey val="0"/>
+            <c:showVal val="1"/>
+            <c:showCatName val="0"/>
+            <c:showSerName val="0"/>
+            <c:showPercent val="0"/>
+            <c:showBubbleSize val="0"/>
+            <c:showLeaderLines val="0"/>
+            <c:extLst>
+              <c:ext xmlns:c15="http://schemas.microsoft.com/office/drawing/2012/chart" uri="{CE6537A1-D6FC-4f65-9D91-7224C49458BB}">
+                <c15:layout/>
+                <c15:showLeaderLines val="1"/>
+                <c15:leaderLines>
+                  <c:spPr>
+                    <a:ln w="9525" cap="flat" cmpd="sng" algn="ctr">
+                      <a:solidFill>
+                        <a:schemeClr val="tx1">
+                          <a:lumMod val="35000"/>
+                          <a:lumOff val="65000"/>
+                        </a:schemeClr>
+                      </a:solidFill>
+                      <a:round/>
+                    </a:ln>
+                    <a:effectLst/>
+                  </c:spPr>
+                </c15:leaderLines>
+              </c:ext>
+            </c:extLst>
+          </c:dLbls>
+          <c:cat>
+            <c:strRef>
+              <c:f>Tabelle1!$A$2:$A$4</c:f>
+              <c:strCache>
+                <c:ptCount val="3"/>
+                <c:pt idx="0">
+                  <c:v>Accuracy</c:v>
+                </c:pt>
+                <c:pt idx="1">
+                  <c:v>Precision</c:v>
+                </c:pt>
+                <c:pt idx="2">
+                  <c:v>Recall</c:v>
+                </c:pt>
+              </c:strCache>
+            </c:strRef>
+          </c:cat>
+          <c:val>
+            <c:numRef>
+              <c:f>Tabelle1!$D$2:$D$4</c:f>
+              <c:numCache>
+                <c:formatCode>0.00%</c:formatCode>
+                <c:ptCount val="3"/>
+                <c:pt idx="0">
+                  <c:v>0.8276</c:v>
+                </c:pt>
+                <c:pt idx="1">
+                  <c:v>0.83840000000000003</c:v>
+                </c:pt>
+                <c:pt idx="2">
+                  <c:v>0.80620000000000003</c:v>
+                </c:pt>
+              </c:numCache>
+            </c:numRef>
+          </c:val>
+          <c:extLst>
+            <c:ext xmlns:c16="http://schemas.microsoft.com/office/drawing/2014/chart" uri="{C3380CC4-5D6E-409C-BE32-E72D297353CC}">
+              <c16:uniqueId val="{00000002-CB1C-4803-8449-D9D4C366A9FF}"/>
+            </c:ext>
+          </c:extLst>
+        </c:ser>
+        <c:ser>
+          <c:idx val="3"/>
+          <c:order val="3"/>
+          <c:tx>
+            <c:strRef>
+              <c:f>Tabelle1!$E$1</c:f>
+              <c:strCache>
+                <c:ptCount val="1"/>
+                <c:pt idx="0">
+                  <c:v>SVM</c:v>
+                </c:pt>
+              </c:strCache>
+            </c:strRef>
+          </c:tx>
+          <c:spPr>
+            <a:solidFill>
+              <a:schemeClr val="accent1">
+                <a:lumMod val="60000"/>
+              </a:schemeClr>
+            </a:solidFill>
+            <a:ln>
+              <a:noFill/>
+            </a:ln>
+            <a:effectLst/>
+          </c:spPr>
+          <c:invertIfNegative val="0"/>
+          <c:dLbls>
+            <c:spPr>
+              <a:noFill/>
+              <a:ln>
+                <a:noFill/>
+              </a:ln>
+              <a:effectLst/>
+            </c:spPr>
+            <c:txPr>
+              <a:bodyPr rot="0" spcFirstLastPara="1" vertOverflow="ellipsis" vert="horz" wrap="square" lIns="38100" tIns="19050" rIns="38100" bIns="19050" anchor="ctr" anchorCtr="1">
+                <a:spAutoFit/>
+              </a:bodyPr>
+              <a:lstStyle/>
+              <a:p>
+                <a:pPr>
+                  <a:defRPr sz="1197" b="0" i="0" u="none" strike="noStrike" kern="1200" baseline="0">
+                    <a:solidFill>
+                      <a:schemeClr val="tx1">
+                        <a:lumMod val="75000"/>
+                        <a:lumOff val="25000"/>
+                      </a:schemeClr>
+                    </a:solidFill>
+                    <a:latin typeface="+mn-lt"/>
+                    <a:ea typeface="+mn-ea"/>
+                    <a:cs typeface="+mn-cs"/>
+                  </a:defRPr>
+                </a:pPr>
+                <a:endParaRPr lang="de-DE"/>
+              </a:p>
+            </c:txPr>
+            <c:dLblPos val="outEnd"/>
+            <c:showLegendKey val="0"/>
+            <c:showVal val="1"/>
+            <c:showCatName val="0"/>
+            <c:showSerName val="0"/>
+            <c:showPercent val="0"/>
+            <c:showBubbleSize val="0"/>
+            <c:showLeaderLines val="0"/>
+            <c:extLst>
+              <c:ext xmlns:c15="http://schemas.microsoft.com/office/drawing/2012/chart" uri="{CE6537A1-D6FC-4f65-9D91-7224C49458BB}">
+                <c15:layout/>
+                <c15:showLeaderLines val="1"/>
+                <c15:leaderLines>
+                  <c:spPr>
+                    <a:ln w="9525" cap="flat" cmpd="sng" algn="ctr">
+                      <a:solidFill>
+                        <a:schemeClr val="tx1">
+                          <a:lumMod val="35000"/>
+                          <a:lumOff val="65000"/>
+                        </a:schemeClr>
+                      </a:solidFill>
+                      <a:round/>
+                    </a:ln>
+                    <a:effectLst/>
+                  </c:spPr>
+                </c15:leaderLines>
+              </c:ext>
+            </c:extLst>
+          </c:dLbls>
+          <c:cat>
+            <c:strRef>
+              <c:f>Tabelle1!$A$2:$A$4</c:f>
+              <c:strCache>
+                <c:ptCount val="3"/>
+                <c:pt idx="0">
+                  <c:v>Accuracy</c:v>
+                </c:pt>
+                <c:pt idx="1">
+                  <c:v>Precision</c:v>
+                </c:pt>
+                <c:pt idx="2">
+                  <c:v>Recall</c:v>
+                </c:pt>
+              </c:strCache>
+            </c:strRef>
+          </c:cat>
+          <c:val>
+            <c:numRef>
+              <c:f>Tabelle1!$E$2:$E$4</c:f>
+              <c:numCache>
+                <c:formatCode>0.00%</c:formatCode>
+                <c:ptCount val="3"/>
+                <c:pt idx="0">
+                  <c:v>0.62909999999999999</c:v>
+                </c:pt>
+                <c:pt idx="1">
+                  <c:v>0.57410000000000005</c:v>
+                </c:pt>
+                <c:pt idx="2">
+                  <c:v>0.9647</c:v>
+                </c:pt>
+              </c:numCache>
+            </c:numRef>
+          </c:val>
+          <c:extLst>
+            <c:ext xmlns:c16="http://schemas.microsoft.com/office/drawing/2014/chart" uri="{C3380CC4-5D6E-409C-BE32-E72D297353CC}">
+              <c16:uniqueId val="{00000003-CB1C-4803-8449-D9D4C366A9FF}"/>
+            </c:ext>
+          </c:extLst>
+        </c:ser>
+        <c:ser>
+          <c:idx val="4"/>
+          <c:order val="4"/>
+          <c:tx>
+            <c:strRef>
+              <c:f>Tabelle1!$F$1</c:f>
+              <c:strCache>
+                <c:ptCount val="1"/>
+                <c:pt idx="0">
+                  <c:v>XGBoost</c:v>
+                </c:pt>
+              </c:strCache>
+            </c:strRef>
+          </c:tx>
+          <c:spPr>
+            <a:solidFill>
+              <a:schemeClr val="accent3">
+                <a:lumMod val="60000"/>
+              </a:schemeClr>
+            </a:solidFill>
+            <a:ln>
+              <a:noFill/>
+            </a:ln>
+            <a:effectLst/>
+          </c:spPr>
+          <c:invertIfNegative val="0"/>
+          <c:dLbls>
+            <c:spPr>
+              <a:noFill/>
+              <a:ln>
+                <a:noFill/>
+              </a:ln>
+              <a:effectLst/>
+            </c:spPr>
+            <c:txPr>
+              <a:bodyPr rot="0" spcFirstLastPara="1" vertOverflow="ellipsis" vert="horz" wrap="square" lIns="38100" tIns="19050" rIns="38100" bIns="19050" anchor="ctr" anchorCtr="1">
+                <a:spAutoFit/>
+              </a:bodyPr>
+              <a:lstStyle/>
+              <a:p>
+                <a:pPr>
+                  <a:defRPr sz="1197" b="0" i="0" u="none" strike="noStrike" kern="1200" baseline="0">
+                    <a:solidFill>
+                      <a:schemeClr val="tx1">
+                        <a:lumMod val="75000"/>
+                        <a:lumOff val="25000"/>
+                      </a:schemeClr>
+                    </a:solidFill>
+                    <a:latin typeface="+mn-lt"/>
+                    <a:ea typeface="+mn-ea"/>
+                    <a:cs typeface="+mn-cs"/>
+                  </a:defRPr>
+                </a:pPr>
+                <a:endParaRPr lang="de-DE"/>
+              </a:p>
+            </c:txPr>
+            <c:dLblPos val="outEnd"/>
+            <c:showLegendKey val="0"/>
+            <c:showVal val="1"/>
+            <c:showCatName val="0"/>
+            <c:showSerName val="0"/>
+            <c:showPercent val="0"/>
+            <c:showBubbleSize val="0"/>
+            <c:showLeaderLines val="0"/>
+            <c:extLst>
+              <c:ext xmlns:c15="http://schemas.microsoft.com/office/drawing/2012/chart" uri="{CE6537A1-D6FC-4f65-9D91-7224C49458BB}">
+                <c15:layout/>
+                <c15:showLeaderLines val="1"/>
+                <c15:leaderLines>
+                  <c:spPr>
+                    <a:ln w="9525" cap="flat" cmpd="sng" algn="ctr">
+                      <a:solidFill>
+                        <a:schemeClr val="tx1">
+                          <a:lumMod val="35000"/>
+                          <a:lumOff val="65000"/>
+                        </a:schemeClr>
+                      </a:solidFill>
+                      <a:round/>
+                    </a:ln>
+                    <a:effectLst/>
+                  </c:spPr>
+                </c15:leaderLines>
+              </c:ext>
+            </c:extLst>
+          </c:dLbls>
+          <c:cat>
+            <c:strRef>
+              <c:f>Tabelle1!$A$2:$A$4</c:f>
+              <c:strCache>
+                <c:ptCount val="3"/>
+                <c:pt idx="0">
+                  <c:v>Accuracy</c:v>
+                </c:pt>
+                <c:pt idx="1">
+                  <c:v>Precision</c:v>
+                </c:pt>
+                <c:pt idx="2">
+                  <c:v>Recall</c:v>
+                </c:pt>
+              </c:strCache>
+            </c:strRef>
+          </c:cat>
+          <c:val>
+            <c:numRef>
+              <c:f>Tabelle1!$F$2:$F$4</c:f>
+              <c:numCache>
+                <c:formatCode>0.00%</c:formatCode>
+                <c:ptCount val="3"/>
+                <c:pt idx="0">
+                  <c:v>0.76900000000000002</c:v>
+                </c:pt>
+                <c:pt idx="1">
+                  <c:v>0.77480000000000004</c:v>
+                </c:pt>
+                <c:pt idx="2">
+                  <c:v>0.75019999999999998</c:v>
+                </c:pt>
+              </c:numCache>
+            </c:numRef>
+          </c:val>
+          <c:extLst>
+            <c:ext xmlns:c16="http://schemas.microsoft.com/office/drawing/2014/chart" uri="{C3380CC4-5D6E-409C-BE32-E72D297353CC}">
+              <c16:uniqueId val="{00000004-CB1C-4803-8449-D9D4C366A9FF}"/>
+            </c:ext>
+          </c:extLst>
+        </c:ser>
+        <c:dLbls>
+          <c:dLblPos val="outEnd"/>
+          <c:showLegendKey val="0"/>
+          <c:showVal val="1"/>
+          <c:showCatName val="0"/>
+          <c:showSerName val="0"/>
+          <c:showPercent val="0"/>
+          <c:showBubbleSize val="0"/>
+        </c:dLbls>
+        <c:gapWidth val="219"/>
+        <c:overlap val="-27"/>
+        <c:axId val="819986456"/>
+        <c:axId val="819983832"/>
+      </c:barChart>
+      <c:catAx>
+        <c:axId val="819986456"/>
+        <c:scaling>
+          <c:orientation val="minMax"/>
+        </c:scaling>
+        <c:delete val="0"/>
+        <c:axPos val="b"/>
+        <c:numFmt formatCode="General" sourceLinked="1"/>
+        <c:majorTickMark val="none"/>
+        <c:minorTickMark val="none"/>
+        <c:tickLblPos val="nextTo"/>
+        <c:spPr>
+          <a:noFill/>
+          <a:ln w="9525" cap="flat" cmpd="sng" algn="ctr">
+            <a:solidFill>
+              <a:schemeClr val="tx1">
+                <a:lumMod val="15000"/>
+                <a:lumOff val="85000"/>
+              </a:schemeClr>
+            </a:solidFill>
+            <a:round/>
+          </a:ln>
+          <a:effectLst/>
+        </c:spPr>
+        <c:txPr>
+          <a:bodyPr rot="-60000000" spcFirstLastPara="1" vertOverflow="ellipsis" vert="horz" wrap="square" anchor="ctr" anchorCtr="1"/>
+          <a:lstStyle/>
+          <a:p>
+            <a:pPr>
+              <a:defRPr sz="1197" b="0" i="0" u="none" strike="noStrike" kern="1200" baseline="0">
+                <a:solidFill>
+                  <a:schemeClr val="tx1">
+                    <a:lumMod val="65000"/>
+                    <a:lumOff val="35000"/>
+                  </a:schemeClr>
+                </a:solidFill>
+                <a:latin typeface="+mn-lt"/>
+                <a:ea typeface="+mn-ea"/>
+                <a:cs typeface="+mn-cs"/>
+              </a:defRPr>
+            </a:pPr>
+            <a:endParaRPr lang="de-DE"/>
+          </a:p>
+        </c:txPr>
+        <c:crossAx val="819983832"/>
+        <c:crosses val="autoZero"/>
+        <c:auto val="1"/>
+        <c:lblAlgn val="ctr"/>
+        <c:lblOffset val="100"/>
+        <c:noMultiLvlLbl val="0"/>
+      </c:catAx>
+      <c:valAx>
+        <c:axId val="819983832"/>
+        <c:scaling>
+          <c:orientation val="minMax"/>
+        </c:scaling>
+        <c:delete val="0"/>
+        <c:axPos val="l"/>
+        <c:majorGridlines>
+          <c:spPr>
+            <a:ln w="9525" cap="flat" cmpd="sng" algn="ctr">
+              <a:solidFill>
+                <a:schemeClr val="tx1">
+                  <a:lumMod val="15000"/>
+                  <a:lumOff val="85000"/>
+                </a:schemeClr>
+              </a:solidFill>
+              <a:round/>
+            </a:ln>
+            <a:effectLst/>
+          </c:spPr>
+        </c:majorGridlines>
+        <c:numFmt formatCode="0.00%" sourceLinked="1"/>
+        <c:majorTickMark val="none"/>
+        <c:minorTickMark val="none"/>
+        <c:tickLblPos val="nextTo"/>
+        <c:spPr>
+          <a:noFill/>
+          <a:ln>
+            <a:noFill/>
+          </a:ln>
+          <a:effectLst/>
+        </c:spPr>
+        <c:txPr>
+          <a:bodyPr rot="-60000000" spcFirstLastPara="1" vertOverflow="ellipsis" vert="horz" wrap="square" anchor="ctr" anchorCtr="1"/>
+          <a:lstStyle/>
+          <a:p>
+            <a:pPr>
+              <a:defRPr sz="1197" b="0" i="0" u="none" strike="noStrike" kern="1200" baseline="0">
+                <a:solidFill>
+                  <a:schemeClr val="tx1">
+                    <a:lumMod val="65000"/>
+                    <a:lumOff val="35000"/>
+                  </a:schemeClr>
+                </a:solidFill>
+                <a:latin typeface="+mn-lt"/>
+                <a:ea typeface="+mn-ea"/>
+                <a:cs typeface="+mn-cs"/>
+              </a:defRPr>
+            </a:pPr>
+            <a:endParaRPr lang="de-DE"/>
+          </a:p>
+        </c:txPr>
+        <c:crossAx val="819986456"/>
+        <c:crosses val="autoZero"/>
+        <c:crossBetween val="between"/>
+      </c:valAx>
+      <c:spPr>
+        <a:noFill/>
+        <a:ln>
+          <a:noFill/>
+        </a:ln>
+        <a:effectLst/>
+      </c:spPr>
+    </c:plotArea>
+    <c:legend>
+      <c:legendPos val="b"/>
+      <c:layout/>
+      <c:overlay val="0"/>
+      <c:spPr>
+        <a:noFill/>
+        <a:ln>
+          <a:noFill/>
+        </a:ln>
+        <a:effectLst/>
+      </c:spPr>
+      <c:txPr>
+        <a:bodyPr rot="0" spcFirstLastPara="1" vertOverflow="ellipsis" vert="horz" wrap="square" anchor="ctr" anchorCtr="1"/>
+        <a:lstStyle/>
+        <a:p>
+          <a:pPr>
+            <a:defRPr sz="1197" b="0" i="0" u="none" strike="noStrike" kern="1200" baseline="0">
+              <a:solidFill>
+                <a:schemeClr val="tx1">
+                  <a:lumMod val="65000"/>
+                  <a:lumOff val="35000"/>
+                </a:schemeClr>
+              </a:solidFill>
+              <a:latin typeface="+mn-lt"/>
+              <a:ea typeface="+mn-ea"/>
+              <a:cs typeface="+mn-cs"/>
+            </a:defRPr>
+          </a:pPr>
+          <a:endParaRPr lang="de-DE"/>
+        </a:p>
+      </c:txPr>
+    </c:legend>
+    <c:plotVisOnly val="1"/>
+    <c:dispBlanksAs val="gap"/>
+    <c:showDLblsOverMax val="0"/>
+  </c:chart>
+  <c:spPr>
+    <a:noFill/>
+    <a:ln>
+      <a:noFill/>
+    </a:ln>
+    <a:effectLst/>
+  </c:spPr>
+  <c:txPr>
+    <a:bodyPr/>
+    <a:lstStyle/>
+    <a:p>
+      <a:pPr>
+        <a:defRPr/>
+      </a:pPr>
+      <a:endParaRPr lang="de-DE"/>
+    </a:p>
+  </c:txPr>
+  <c:externalData r:id="rId3">
+    <c:autoUpdate val="0"/>
+  </c:externalData>
+</c:chartSpace>
+</file>
+
+<file path=ppt/charts/colors1.xml><?xml version="1.0" encoding="utf-8"?>
+<cs:colorStyle xmlns:cs="http://schemas.microsoft.com/office/drawing/2012/chartStyle" xmlns:a="http://schemas.openxmlformats.org/drawingml/2006/main" meth="cycle" id="11">
+  <a:schemeClr val="accent1"/>
+  <a:schemeClr val="accent3"/>
+  <a:schemeClr val="accent5"/>
+  <cs:variation/>
+  <cs:variation>
+    <a:lumMod val="60000"/>
+  </cs:variation>
+  <cs:variation>
+    <a:lumMod val="80000"/>
+    <a:lumOff val="20000"/>
+  </cs:variation>
+  <cs:variation>
+    <a:lumMod val="80000"/>
+  </cs:variation>
+  <cs:variation>
+    <a:lumMod val="60000"/>
+    <a:lumOff val="40000"/>
+  </cs:variation>
+  <cs:variation>
+    <a:lumMod val="50000"/>
+  </cs:variation>
+  <cs:variation>
+    <a:lumMod val="70000"/>
+    <a:lumOff val="30000"/>
+  </cs:variation>
+  <cs:variation>
+    <a:lumMod val="70000"/>
+  </cs:variation>
+  <cs:variation>
+    <a:lumMod val="50000"/>
+    <a:lumOff val="50000"/>
+  </cs:variation>
+</cs:colorStyle>
+</file>
+
+<file path=ppt/charts/style1.xml><?xml version="1.0" encoding="utf-8"?>
+<cs:chartStyle xmlns:cs="http://schemas.microsoft.com/office/drawing/2012/chartStyle" xmlns:a="http://schemas.openxmlformats.org/drawingml/2006/main" id="201">
+  <cs:axisTitle>
+    <cs:lnRef idx="0"/>
+    <cs:fillRef idx="0"/>
+    <cs:effectRef idx="0"/>
+    <cs:fontRef idx="minor">
+      <a:schemeClr val="tx1">
+        <a:lumMod val="65000"/>
+        <a:lumOff val="35000"/>
+      </a:schemeClr>
+    </cs:fontRef>
+    <cs:defRPr sz="1330" kern="1200"/>
+  </cs:axisTitle>
+  <cs:categoryAxis>
+    <cs:lnRef idx="0"/>
+    <cs:fillRef idx="0"/>
+    <cs:effectRef idx="0"/>
+    <cs:fontRef idx="minor">
+      <a:schemeClr val="tx1">
+        <a:lumMod val="65000"/>
+        <a:lumOff val="35000"/>
+      </a:schemeClr>
+    </cs:fontRef>
+    <cs:spPr>
+      <a:ln w="9525" cap="flat" cmpd="sng" algn="ctr">
+        <a:solidFill>
+          <a:schemeClr val="tx1">
+            <a:lumMod val="15000"/>
+            <a:lumOff val="85000"/>
+          </a:schemeClr>
+        </a:solidFill>
+        <a:round/>
+      </a:ln>
+    </cs:spPr>
+    <cs:defRPr sz="1197" kern="1200"/>
+  </cs:categoryAxis>
+  <cs:chartArea mods="allowNoFillOverride allowNoLineOverride">
+    <cs:lnRef idx="0"/>
+    <cs:fillRef idx="0"/>
+    <cs:effectRef idx="0"/>
+    <cs:fontRef idx="minor">
+      <a:schemeClr val="tx1"/>
+    </cs:fontRef>
+    <cs:spPr>
+      <a:solidFill>
+        <a:schemeClr val="bg1"/>
+      </a:solidFill>
+      <a:ln w="9525" cap="flat" cmpd="sng" algn="ctr">
+        <a:solidFill>
+          <a:schemeClr val="tx1">
+            <a:lumMod val="15000"/>
+            <a:lumOff val="85000"/>
+          </a:schemeClr>
+        </a:solidFill>
+        <a:round/>
+      </a:ln>
+    </cs:spPr>
+    <cs:defRPr sz="1330" kern="1200"/>
+  </cs:chartArea>
+  <cs:dataLabel>
+    <cs:lnRef idx="0"/>
+    <cs:fillRef idx="0"/>
+    <cs:effectRef idx="0"/>
+    <cs:fontRef idx="minor">
+      <a:schemeClr val="tx1">
+        <a:lumMod val="75000"/>
+        <a:lumOff val="25000"/>
+      </a:schemeClr>
+    </cs:fontRef>
+    <cs:defRPr sz="1197" kern="1200"/>
+  </cs:dataLabel>
+  <cs:dataLabelCallout>
+    <cs:lnRef idx="0"/>
+    <cs:fillRef idx="0"/>
+    <cs:effectRef idx="0"/>
+    <cs:fontRef idx="minor">
+      <a:schemeClr val="dk1">
+        <a:lumMod val="65000"/>
+        <a:lumOff val="35000"/>
+      </a:schemeClr>
+    </cs:fontRef>
+    <cs:spPr>
+      <a:solidFill>
+        <a:schemeClr val="lt1"/>
+      </a:solidFill>
+      <a:ln>
+        <a:solidFill>
+          <a:schemeClr val="dk1">
+            <a:lumMod val="25000"/>
+            <a:lumOff val="75000"/>
+          </a:schemeClr>
+        </a:solidFill>
+      </a:ln>
+    </cs:spPr>
+    <cs:defRPr sz="1197" kern="1200"/>
+    <cs:bodyPr rot="0" spcFirstLastPara="1" vertOverflow="clip" horzOverflow="clip" vert="horz" wrap="square" lIns="36576" tIns="18288" rIns="36576" bIns="18288" anchor="ctr" anchorCtr="1">
+      <a:spAutoFit/>
+    </cs:bodyPr>
+  </cs:dataLabelCallout>
+  <cs:dataPoint>
+    <cs:lnRef idx="0"/>
+    <cs:fillRef idx="1">
+      <cs:styleClr val="auto"/>
+    </cs:fillRef>
+    <cs:effectRef idx="0"/>
+    <cs:fontRef idx="minor">
+      <a:schemeClr val="tx1"/>
+    </cs:fontRef>
+  </cs:dataPoint>
+  <cs:dataPoint3D>
+    <cs:lnRef idx="0"/>
+    <cs:fillRef idx="1">
+      <cs:styleClr val="auto"/>
+    </cs:fillRef>
+    <cs:effectRef idx="0"/>
+    <cs:fontRef idx="minor">
+      <a:schemeClr val="tx1"/>
+    </cs:fontRef>
+  </cs:dataPoint3D>
+  <cs:dataPointLine>
+    <cs:lnRef idx="0">
+      <cs:styleClr val="auto"/>
+    </cs:lnRef>
+    <cs:fillRef idx="1"/>
+    <cs:effectRef idx="0"/>
+    <cs:fontRef idx="minor">
+      <a:schemeClr val="tx1"/>
+    </cs:fontRef>
+    <cs:spPr>
+      <a:ln w="28575" cap="rnd">
+        <a:solidFill>
+          <a:schemeClr val="phClr"/>
+        </a:solidFill>
+        <a:round/>
+      </a:ln>
+    </cs:spPr>
+  </cs:dataPointLine>
+  <cs:dataPointMarker>
+    <cs:lnRef idx="0">
+      <cs:styleClr val="auto"/>
+    </cs:lnRef>
+    <cs:fillRef idx="1">
+      <cs:styleClr val="auto"/>
+    </cs:fillRef>
+    <cs:effectRef idx="0"/>
+    <cs:fontRef idx="minor">
+      <a:schemeClr val="tx1"/>
+    </cs:fontRef>
+    <cs:spPr>
+      <a:ln w="9525">
+        <a:solidFill>
+          <a:schemeClr val="phClr"/>
+        </a:solidFill>
+      </a:ln>
+    </cs:spPr>
+  </cs:dataPointMarker>
+  <cs:dataPointMarkerLayout symbol="circle" size="5"/>
+  <cs:dataPointWireframe>
+    <cs:lnRef idx="0">
+      <cs:styleClr val="auto"/>
+    </cs:lnRef>
+    <cs:fillRef idx="1"/>
+    <cs:effectRef idx="0"/>
+    <cs:fontRef idx="minor">
+      <a:schemeClr val="tx1"/>
+    </cs:fontRef>
+    <cs:spPr>
+      <a:ln w="9525" cap="rnd">
+        <a:solidFill>
+          <a:schemeClr val="phClr"/>
+        </a:solidFill>
+        <a:round/>
+      </a:ln>
+    </cs:spPr>
+  </cs:dataPointWireframe>
+  <cs:dataTable>
+    <cs:lnRef idx="0"/>
+    <cs:fillRef idx="0"/>
+    <cs:effectRef idx="0"/>
+    <cs:fontRef idx="minor">
+      <a:schemeClr val="tx1">
+        <a:lumMod val="65000"/>
+        <a:lumOff val="35000"/>
+      </a:schemeClr>
+    </cs:fontRef>
+    <cs:spPr>
+      <a:noFill/>
+      <a:ln w="9525" cap="flat" cmpd="sng" algn="ctr">
+        <a:solidFill>
+          <a:schemeClr val="tx1">
+            <a:lumMod val="15000"/>
+            <a:lumOff val="85000"/>
+          </a:schemeClr>
+        </a:solidFill>
+        <a:round/>
+      </a:ln>
+    </cs:spPr>
+    <cs:defRPr sz="1197" kern="1200"/>
+  </cs:dataTable>
+  <cs:downBar>
+    <cs:lnRef idx="0"/>
+    <cs:fillRef idx="0"/>
+    <cs:effectRef idx="0"/>
+    <cs:fontRef idx="minor">
+      <a:schemeClr val="dk1"/>
+    </cs:fontRef>
+    <cs:spPr>
+      <a:solidFill>
+        <a:schemeClr val="dk1">
+          <a:lumMod val="65000"/>
+          <a:lumOff val="35000"/>
+        </a:schemeClr>
+      </a:solidFill>
+      <a:ln w="9525">
+        <a:solidFill>
+          <a:schemeClr val="tx1">
+            <a:lumMod val="65000"/>
+            <a:lumOff val="35000"/>
+          </a:schemeClr>
+        </a:solidFill>
+      </a:ln>
+    </cs:spPr>
+  </cs:downBar>
+  <cs:dropLine>
+    <cs:lnRef idx="0"/>
+    <cs:fillRef idx="0"/>
+    <cs:effectRef idx="0"/>
+    <cs:fontRef idx="minor">
+      <a:schemeClr val="tx1"/>
+    </cs:fontRef>
+    <cs:spPr>
+      <a:ln w="9525" cap="flat" cmpd="sng" algn="ctr">
+        <a:solidFill>
+          <a:schemeClr val="tx1">
+            <a:lumMod val="35000"/>
+            <a:lumOff val="65000"/>
+          </a:schemeClr>
+        </a:solidFill>
+        <a:round/>
+      </a:ln>
+    </cs:spPr>
+  </cs:dropLine>
+  <cs:errorBar>
+    <cs:lnRef idx="0"/>
+    <cs:fillRef idx="0"/>
+    <cs:effectRef idx="0"/>
+    <cs:fontRef idx="minor">
+      <a:schemeClr val="tx1"/>
+    </cs:fontRef>
+    <cs:spPr>
+      <a:ln w="9525" cap="flat" cmpd="sng" algn="ctr">
+        <a:solidFill>
+          <a:schemeClr val="tx1">
+            <a:lumMod val="65000"/>
+            <a:lumOff val="35000"/>
+          </a:schemeClr>
+        </a:solidFill>
+        <a:round/>
+      </a:ln>
+    </cs:spPr>
+  </cs:errorBar>
+  <cs:floor>
+    <cs:lnRef idx="0"/>
+    <cs:fillRef idx="0"/>
+    <cs:effectRef idx="0"/>
+    <cs:fontRef idx="minor">
+      <a:schemeClr val="tx1"/>
+    </cs:fontRef>
+    <cs:spPr>
+      <a:noFill/>
+      <a:ln>
+        <a:noFill/>
+      </a:ln>
+    </cs:spPr>
+  </cs:floor>
+  <cs:gridlineMajor>
+    <cs:lnRef idx="0"/>
+    <cs:fillRef idx="0"/>
+    <cs:effectRef idx="0"/>
+    <cs:fontRef idx="minor">
+      <a:schemeClr val="tx1"/>
+    </cs:fontRef>
+    <cs:spPr>
+      <a:ln w="9525" cap="flat" cmpd="sng" algn="ctr">
+        <a:solidFill>
+          <a:schemeClr val="tx1">
+            <a:lumMod val="15000"/>
+            <a:lumOff val="85000"/>
+          </a:schemeClr>
+        </a:solidFill>
+        <a:round/>
+      </a:ln>
+    </cs:spPr>
+  </cs:gridlineMajor>
+  <cs:gridlineMinor>
+    <cs:lnRef idx="0"/>
+    <cs:fillRef idx="0"/>
+    <cs:effectRef idx="0"/>
+    <cs:fontRef idx="minor">
+      <a:schemeClr val="tx1"/>
+    </cs:fontRef>
+    <cs:spPr>
+      <a:ln w="9525" cap="flat" cmpd="sng" algn="ctr">
+        <a:solidFill>
+          <a:schemeClr val="tx1">
+            <a:lumMod val="5000"/>
+            <a:lumOff val="95000"/>
+          </a:schemeClr>
+        </a:solidFill>
+        <a:round/>
+      </a:ln>
+    </cs:spPr>
+  </cs:gridlineMinor>
+  <cs:hiLoLine>
+    <cs:lnRef idx="0"/>
+    <cs:fillRef idx="0"/>
+    <cs:effectRef idx="0"/>
+    <cs:fontRef idx="minor">
+      <a:schemeClr val="tx1"/>
+    </cs:fontRef>
+    <cs:spPr>
+      <a:ln w="9525" cap="flat" cmpd="sng" algn="ctr">
+        <a:solidFill>
+          <a:schemeClr val="tx1">
+            <a:lumMod val="75000"/>
+            <a:lumOff val="25000"/>
+          </a:schemeClr>
+        </a:solidFill>
+        <a:round/>
+      </a:ln>
+    </cs:spPr>
+  </cs:hiLoLine>
+  <cs:leaderLine>
+    <cs:lnRef idx="0"/>
+    <cs:fillRef idx="0"/>
+    <cs:effectRef idx="0"/>
+    <cs:fontRef idx="minor">
+      <a:schemeClr val="tx1"/>
+    </cs:fontRef>
+    <cs:spPr>
+      <a:ln w="9525" cap="flat" cmpd="sng" algn="ctr">
+        <a:solidFill>
+          <a:schemeClr val="tx1">
+            <a:lumMod val="35000"/>
+            <a:lumOff val="65000"/>
+          </a:schemeClr>
+        </a:solidFill>
+        <a:round/>
+      </a:ln>
+    </cs:spPr>
+  </cs:leaderLine>
+  <cs:legend>
+    <cs:lnRef idx="0"/>
+    <cs:fillRef idx="0"/>
+    <cs:effectRef idx="0"/>
+    <cs:fontRef idx="minor">
+      <a:schemeClr val="tx1">
+        <a:lumMod val="65000"/>
+        <a:lumOff val="35000"/>
+      </a:schemeClr>
+    </cs:fontRef>
+    <cs:defRPr sz="1197" kern="1200"/>
+  </cs:legend>
+  <cs:plotArea mods="allowNoFillOverride allowNoLineOverride">
+    <cs:lnRef idx="0"/>
+    <cs:fillRef idx="0"/>
+    <cs:effectRef idx="0"/>
+    <cs:fontRef idx="minor">
+      <a:schemeClr val="tx1"/>
+    </cs:fontRef>
+  </cs:plotArea>
+  <cs:plotArea3D mods="allowNoFillOverride allowNoLineOverride">
+    <cs:lnRef idx="0"/>
+    <cs:fillRef idx="0"/>
+    <cs:effectRef idx="0"/>
+    <cs:fontRef idx="minor">
+      <a:schemeClr val="tx1"/>
+    </cs:fontRef>
+  </cs:plotArea3D>
+  <cs:seriesAxis>
+    <cs:lnRef idx="0"/>
+    <cs:fillRef idx="0"/>
+    <cs:effectRef idx="0"/>
+    <cs:fontRef idx="minor">
+      <a:schemeClr val="tx1">
+        <a:lumMod val="65000"/>
+        <a:lumOff val="35000"/>
+      </a:schemeClr>
+    </cs:fontRef>
+    <cs:defRPr sz="1197" kern="1200"/>
+  </cs:seriesAxis>
+  <cs:seriesLine>
+    <cs:lnRef idx="0"/>
+    <cs:fillRef idx="0"/>
+    <cs:effectRef idx="0"/>
+    <cs:fontRef idx="minor">
+      <a:schemeClr val="tx1"/>
+    </cs:fontRef>
+    <cs:spPr>
+      <a:ln w="9525" cap="flat" cmpd="sng" algn="ctr">
+        <a:solidFill>
+          <a:schemeClr val="tx1">
+            <a:lumMod val="35000"/>
+            <a:lumOff val="65000"/>
+          </a:schemeClr>
+        </a:solidFill>
+        <a:round/>
+      </a:ln>
+    </cs:spPr>
+  </cs:seriesLine>
+  <cs:title>
+    <cs:lnRef idx="0"/>
+    <cs:fillRef idx="0"/>
+    <cs:effectRef idx="0"/>
+    <cs:fontRef idx="minor">
+      <a:schemeClr val="tx1">
+        <a:lumMod val="65000"/>
+        <a:lumOff val="35000"/>
+      </a:schemeClr>
+    </cs:fontRef>
+    <cs:defRPr sz="1862" b="0" kern="1200" spc="0" baseline="0"/>
+  </cs:title>
+  <cs:trendline>
+    <cs:lnRef idx="0">
+      <cs:styleClr val="auto"/>
+    </cs:lnRef>
+    <cs:fillRef idx="0"/>
+    <cs:effectRef idx="0"/>
+    <cs:fontRef idx="minor">
+      <a:schemeClr val="tx1"/>
+    </cs:fontRef>
+    <cs:spPr>
+      <a:ln w="19050" cap="rnd">
+        <a:solidFill>
+          <a:schemeClr val="phClr"/>
+        </a:solidFill>
+        <a:prstDash val="sysDot"/>
+      </a:ln>
+    </cs:spPr>
+  </cs:trendline>
+  <cs:trendlineLabel>
+    <cs:lnRef idx="0"/>
+    <cs:fillRef idx="0"/>
+    <cs:effectRef idx="0"/>
+    <cs:fontRef idx="minor">
+      <a:schemeClr val="tx1">
+        <a:lumMod val="65000"/>
+        <a:lumOff val="35000"/>
+      </a:schemeClr>
+    </cs:fontRef>
+    <cs:defRPr sz="1197" kern="1200"/>
+  </cs:trendlineLabel>
+  <cs:upBar>
+    <cs:lnRef idx="0"/>
+    <cs:fillRef idx="0"/>
+    <cs:effectRef idx="0"/>
+    <cs:fontRef idx="minor">
+      <a:schemeClr val="dk1"/>
+    </cs:fontRef>
+    <cs:spPr>
+      <a:solidFill>
+        <a:schemeClr val="lt1"/>
+      </a:solidFill>
+      <a:ln w="9525">
+        <a:solidFill>
+          <a:schemeClr val="tx1">
+            <a:lumMod val="15000"/>
+            <a:lumOff val="85000"/>
+          </a:schemeClr>
+        </a:solidFill>
+      </a:ln>
+    </cs:spPr>
+  </cs:upBar>
+  <cs:valueAxis>
+    <cs:lnRef idx="0"/>
+    <cs:fillRef idx="0"/>
+    <cs:effectRef idx="0"/>
+    <cs:fontRef idx="minor">
+      <a:schemeClr val="tx1">
+        <a:lumMod val="65000"/>
+        <a:lumOff val="35000"/>
+      </a:schemeClr>
+    </cs:fontRef>
+    <cs:defRPr sz="1197" kern="1200"/>
+  </cs:valueAxis>
+  <cs:wall>
+    <cs:lnRef idx="0"/>
+    <cs:fillRef idx="0"/>
+    <cs:effectRef idx="0"/>
+    <cs:fontRef idx="minor">
+      <a:schemeClr val="tx1"/>
+    </cs:fontRef>
+    <cs:spPr>
+      <a:noFill/>
+      <a:ln>
+        <a:noFill/>
+      </a:ln>
+    </cs:spPr>
+  </cs:wall>
+</cs:chartStyle>
+</file>
+
 <file path=ppt/notesMasters/notesMaster1.xml><?xml version="1.0" encoding="utf-8"?>
 <p:notesMaster xmlns:a="http://schemas.openxmlformats.org/drawingml/2006/main" xmlns:r="http://schemas.openxmlformats.org/officeDocument/2006/relationships" xmlns:p="http://schemas.openxmlformats.org/presentationml/2006/main">
   <p:cSld>
@@ -1085,7 +2521,7 @@
           <a:p>
             <a:fld id="{9B39517B-FB26-4CEE-A0CD-05465EABC2B5}" type="datetimeFigureOut">
               <a:rPr lang="de-DE" smtClean="0"/>
-              <a:t>05.03.2023</a:t>
+              <a:t>08.03.2023</a:t>
             </a:fld>
             <a:endParaRPr lang="de-DE"/>
           </a:p>
@@ -1517,7 +2953,7 @@
           <a:p>
             <a:fld id="{8CE265D3-6F69-46A3-BC22-BD3030E0EBE5}" type="slidenum">
               <a:rPr lang="de-DE" smtClean="0"/>
-              <a:t>3</a:t>
+              <a:t>5</a:t>
             </a:fld>
             <a:endParaRPr lang="de-DE"/>
           </a:p>
@@ -1669,7 +3105,7 @@
           <a:p>
             <a:fld id="{8CE265D3-6F69-46A3-BC22-BD3030E0EBE5}" type="slidenum">
               <a:rPr lang="de-DE" smtClean="0"/>
-              <a:t>4</a:t>
+              <a:t>6</a:t>
             </a:fld>
             <a:endParaRPr lang="de-DE"/>
           </a:p>
@@ -2533,7 +3969,7 @@
           <a:p>
             <a:fld id="{8CE265D3-6F69-46A3-BC22-BD3030E0EBE5}" type="slidenum">
               <a:rPr lang="de-DE" smtClean="0"/>
-              <a:t>5</a:t>
+              <a:t>7</a:t>
             </a:fld>
             <a:endParaRPr lang="de-DE"/>
           </a:p>
@@ -2905,7 +4341,7 @@
           <a:p>
             <a:fld id="{8CE265D3-6F69-46A3-BC22-BD3030E0EBE5}" type="slidenum">
               <a:rPr lang="de-DE" smtClean="0"/>
-              <a:t>7</a:t>
+              <a:t>9</a:t>
             </a:fld>
             <a:endParaRPr lang="de-DE"/>
           </a:p>
@@ -2915,6 +4351,358 @@
     <p:extLst>
       <p:ext uri="{BB962C8B-B14F-4D97-AF65-F5344CB8AC3E}">
         <p14:creationId xmlns:p14="http://schemas.microsoft.com/office/powerpoint/2010/main" val="1128390822"/>
+      </p:ext>
+    </p:extLst>
+  </p:cSld>
+  <p:clrMapOvr>
+    <a:masterClrMapping/>
+  </p:clrMapOvr>
+</p:notes>
+</file>
+
+<file path=ppt/notesSlides/notesSlide6.xml><?xml version="1.0" encoding="utf-8"?>
+<p:notes xmlns:a="http://schemas.openxmlformats.org/drawingml/2006/main" xmlns:r="http://schemas.openxmlformats.org/officeDocument/2006/relationships" xmlns:p="http://schemas.openxmlformats.org/presentationml/2006/main">
+  <p:cSld>
+    <p:spTree>
+      <p:nvGrpSpPr>
+        <p:cNvPr id="1" name=""/>
+        <p:cNvGrpSpPr/>
+        <p:nvPr/>
+      </p:nvGrpSpPr>
+      <p:grpSpPr>
+        <a:xfrm>
+          <a:off x="0" y="0"/>
+          <a:ext cx="0" cy="0"/>
+          <a:chOff x="0" y="0"/>
+          <a:chExt cx="0" cy="0"/>
+        </a:xfrm>
+      </p:grpSpPr>
+      <p:sp>
+        <p:nvSpPr>
+          <p:cNvPr id="2" name="Folienbildplatzhalter 1"/>
+          <p:cNvSpPr>
+            <a:spLocks noGrp="1" noRot="1" noChangeAspect="1"/>
+          </p:cNvSpPr>
+          <p:nvPr>
+            <p:ph type="sldImg"/>
+          </p:nvPr>
+        </p:nvSpPr>
+        <p:spPr/>
+      </p:sp>
+      <p:sp>
+        <p:nvSpPr>
+          <p:cNvPr id="3" name="Notizenplatzhalter 2"/>
+          <p:cNvSpPr>
+            <a:spLocks noGrp="1"/>
+          </p:cNvSpPr>
+          <p:nvPr>
+            <p:ph type="body" idx="1"/>
+          </p:nvPr>
+        </p:nvSpPr>
+        <p:spPr/>
+        <p:txBody>
+          <a:bodyPr/>
+          <a:lstStyle/>
+          <a:p>
+            <a:r>
+              <a:rPr lang="en-US" dirty="0"/>
+              <a:t>Introduction to use case, goal, selection of data set</a:t>
+            </a:r>
+            <a:endParaRPr lang="de-DE" dirty="0"/>
+          </a:p>
+        </p:txBody>
+      </p:sp>
+      <p:sp>
+        <p:nvSpPr>
+          <p:cNvPr id="4" name="Foliennummernplatzhalter 3"/>
+          <p:cNvSpPr>
+            <a:spLocks noGrp="1"/>
+          </p:cNvSpPr>
+          <p:nvPr>
+            <p:ph type="sldNum" sz="quarter" idx="5"/>
+          </p:nvPr>
+        </p:nvSpPr>
+        <p:spPr/>
+        <p:txBody>
+          <a:bodyPr/>
+          <a:lstStyle/>
+          <a:p>
+            <a:fld id="{8CE265D3-6F69-46A3-BC22-BD3030E0EBE5}" type="slidenum">
+              <a:rPr lang="de-DE" smtClean="0"/>
+              <a:t>20</a:t>
+            </a:fld>
+            <a:endParaRPr lang="de-DE"/>
+          </a:p>
+        </p:txBody>
+      </p:sp>
+    </p:spTree>
+    <p:extLst>
+      <p:ext uri="{BB962C8B-B14F-4D97-AF65-F5344CB8AC3E}">
+        <p14:creationId xmlns:p14="http://schemas.microsoft.com/office/powerpoint/2010/main" val="2283732287"/>
+      </p:ext>
+    </p:extLst>
+  </p:cSld>
+  <p:clrMapOvr>
+    <a:masterClrMapping/>
+  </p:clrMapOvr>
+</p:notes>
+</file>
+
+<file path=ppt/notesSlides/notesSlide7.xml><?xml version="1.0" encoding="utf-8"?>
+<p:notes xmlns:a="http://schemas.openxmlformats.org/drawingml/2006/main" xmlns:r="http://schemas.openxmlformats.org/officeDocument/2006/relationships" xmlns:p="http://schemas.openxmlformats.org/presentationml/2006/main">
+  <p:cSld>
+    <p:spTree>
+      <p:nvGrpSpPr>
+        <p:cNvPr id="1" name=""/>
+        <p:cNvGrpSpPr/>
+        <p:nvPr/>
+      </p:nvGrpSpPr>
+      <p:grpSpPr>
+        <a:xfrm>
+          <a:off x="0" y="0"/>
+          <a:ext cx="0" cy="0"/>
+          <a:chOff x="0" y="0"/>
+          <a:chExt cx="0" cy="0"/>
+        </a:xfrm>
+      </p:grpSpPr>
+      <p:sp>
+        <p:nvSpPr>
+          <p:cNvPr id="2" name="Folienbildplatzhalter 1"/>
+          <p:cNvSpPr>
+            <a:spLocks noGrp="1" noRot="1" noChangeAspect="1"/>
+          </p:cNvSpPr>
+          <p:nvPr>
+            <p:ph type="sldImg"/>
+          </p:nvPr>
+        </p:nvSpPr>
+        <p:spPr/>
+      </p:sp>
+      <p:sp>
+        <p:nvSpPr>
+          <p:cNvPr id="3" name="Notizenplatzhalter 2"/>
+          <p:cNvSpPr>
+            <a:spLocks noGrp="1"/>
+          </p:cNvSpPr>
+          <p:nvPr>
+            <p:ph type="body" idx="1"/>
+          </p:nvPr>
+        </p:nvSpPr>
+        <p:spPr/>
+        <p:txBody>
+          <a:bodyPr/>
+          <a:lstStyle/>
+          <a:p>
+            <a:r>
+              <a:rPr lang="en-US" dirty="0"/>
+              <a:t>Introduction to use case, goal, selection of data set</a:t>
+            </a:r>
+            <a:endParaRPr lang="de-DE" dirty="0"/>
+          </a:p>
+        </p:txBody>
+      </p:sp>
+      <p:sp>
+        <p:nvSpPr>
+          <p:cNvPr id="4" name="Foliennummernplatzhalter 3"/>
+          <p:cNvSpPr>
+            <a:spLocks noGrp="1"/>
+          </p:cNvSpPr>
+          <p:nvPr>
+            <p:ph type="sldNum" sz="quarter" idx="5"/>
+          </p:nvPr>
+        </p:nvSpPr>
+        <p:spPr/>
+        <p:txBody>
+          <a:bodyPr/>
+          <a:lstStyle/>
+          <a:p>
+            <a:fld id="{8CE265D3-6F69-46A3-BC22-BD3030E0EBE5}" type="slidenum">
+              <a:rPr lang="de-DE" smtClean="0"/>
+              <a:t>21</a:t>
+            </a:fld>
+            <a:endParaRPr lang="de-DE"/>
+          </a:p>
+        </p:txBody>
+      </p:sp>
+    </p:spTree>
+    <p:extLst>
+      <p:ext uri="{BB962C8B-B14F-4D97-AF65-F5344CB8AC3E}">
+        <p14:creationId xmlns:p14="http://schemas.microsoft.com/office/powerpoint/2010/main" val="2838446326"/>
+      </p:ext>
+    </p:extLst>
+  </p:cSld>
+  <p:clrMapOvr>
+    <a:masterClrMapping/>
+  </p:clrMapOvr>
+</p:notes>
+</file>
+
+<file path=ppt/notesSlides/notesSlide8.xml><?xml version="1.0" encoding="utf-8"?>
+<p:notes xmlns:a="http://schemas.openxmlformats.org/drawingml/2006/main" xmlns:r="http://schemas.openxmlformats.org/officeDocument/2006/relationships" xmlns:p="http://schemas.openxmlformats.org/presentationml/2006/main">
+  <p:cSld>
+    <p:spTree>
+      <p:nvGrpSpPr>
+        <p:cNvPr id="1" name=""/>
+        <p:cNvGrpSpPr/>
+        <p:nvPr/>
+      </p:nvGrpSpPr>
+      <p:grpSpPr>
+        <a:xfrm>
+          <a:off x="0" y="0"/>
+          <a:ext cx="0" cy="0"/>
+          <a:chOff x="0" y="0"/>
+          <a:chExt cx="0" cy="0"/>
+        </a:xfrm>
+      </p:grpSpPr>
+      <p:sp>
+        <p:nvSpPr>
+          <p:cNvPr id="2" name="Folienbildplatzhalter 1"/>
+          <p:cNvSpPr>
+            <a:spLocks noGrp="1" noRot="1" noChangeAspect="1"/>
+          </p:cNvSpPr>
+          <p:nvPr>
+            <p:ph type="sldImg"/>
+          </p:nvPr>
+        </p:nvSpPr>
+        <p:spPr/>
+      </p:sp>
+      <p:sp>
+        <p:nvSpPr>
+          <p:cNvPr id="3" name="Notizenplatzhalter 2"/>
+          <p:cNvSpPr>
+            <a:spLocks noGrp="1"/>
+          </p:cNvSpPr>
+          <p:nvPr>
+            <p:ph type="body" idx="1"/>
+          </p:nvPr>
+        </p:nvSpPr>
+        <p:spPr/>
+        <p:txBody>
+          <a:bodyPr/>
+          <a:lstStyle/>
+          <a:p>
+            <a:r>
+              <a:rPr lang="en-US" dirty="0"/>
+              <a:t>Introduction to use case, goal, selection of data set</a:t>
+            </a:r>
+            <a:endParaRPr lang="de-DE" dirty="0"/>
+          </a:p>
+        </p:txBody>
+      </p:sp>
+      <p:sp>
+        <p:nvSpPr>
+          <p:cNvPr id="4" name="Foliennummernplatzhalter 3"/>
+          <p:cNvSpPr>
+            <a:spLocks noGrp="1"/>
+          </p:cNvSpPr>
+          <p:nvPr>
+            <p:ph type="sldNum" sz="quarter" idx="5"/>
+          </p:nvPr>
+        </p:nvSpPr>
+        <p:spPr/>
+        <p:txBody>
+          <a:bodyPr/>
+          <a:lstStyle/>
+          <a:p>
+            <a:fld id="{8CE265D3-6F69-46A3-BC22-BD3030E0EBE5}" type="slidenum">
+              <a:rPr lang="de-DE" smtClean="0"/>
+              <a:t>22</a:t>
+            </a:fld>
+            <a:endParaRPr lang="de-DE"/>
+          </a:p>
+        </p:txBody>
+      </p:sp>
+    </p:spTree>
+    <p:extLst>
+      <p:ext uri="{BB962C8B-B14F-4D97-AF65-F5344CB8AC3E}">
+        <p14:creationId xmlns:p14="http://schemas.microsoft.com/office/powerpoint/2010/main" val="2354534142"/>
+      </p:ext>
+    </p:extLst>
+  </p:cSld>
+  <p:clrMapOvr>
+    <a:masterClrMapping/>
+  </p:clrMapOvr>
+</p:notes>
+</file>
+
+<file path=ppt/notesSlides/notesSlide9.xml><?xml version="1.0" encoding="utf-8"?>
+<p:notes xmlns:a="http://schemas.openxmlformats.org/drawingml/2006/main" xmlns:r="http://schemas.openxmlformats.org/officeDocument/2006/relationships" xmlns:p="http://schemas.openxmlformats.org/presentationml/2006/main">
+  <p:cSld>
+    <p:spTree>
+      <p:nvGrpSpPr>
+        <p:cNvPr id="1" name=""/>
+        <p:cNvGrpSpPr/>
+        <p:nvPr/>
+      </p:nvGrpSpPr>
+      <p:grpSpPr>
+        <a:xfrm>
+          <a:off x="0" y="0"/>
+          <a:ext cx="0" cy="0"/>
+          <a:chOff x="0" y="0"/>
+          <a:chExt cx="0" cy="0"/>
+        </a:xfrm>
+      </p:grpSpPr>
+      <p:sp>
+        <p:nvSpPr>
+          <p:cNvPr id="2" name="Folienbildplatzhalter 1"/>
+          <p:cNvSpPr>
+            <a:spLocks noGrp="1" noRot="1" noChangeAspect="1"/>
+          </p:cNvSpPr>
+          <p:nvPr>
+            <p:ph type="sldImg"/>
+          </p:nvPr>
+        </p:nvSpPr>
+        <p:spPr/>
+      </p:sp>
+      <p:sp>
+        <p:nvSpPr>
+          <p:cNvPr id="3" name="Notizenplatzhalter 2"/>
+          <p:cNvSpPr>
+            <a:spLocks noGrp="1"/>
+          </p:cNvSpPr>
+          <p:nvPr>
+            <p:ph type="body" idx="1"/>
+          </p:nvPr>
+        </p:nvSpPr>
+        <p:spPr/>
+        <p:txBody>
+          <a:bodyPr/>
+          <a:lstStyle/>
+          <a:p>
+            <a:r>
+              <a:rPr lang="en-US" dirty="0"/>
+              <a:t>Introduction to use case, goal, selection of data set</a:t>
+            </a:r>
+            <a:endParaRPr lang="de-DE" dirty="0"/>
+          </a:p>
+        </p:txBody>
+      </p:sp>
+      <p:sp>
+        <p:nvSpPr>
+          <p:cNvPr id="4" name="Foliennummernplatzhalter 3"/>
+          <p:cNvSpPr>
+            <a:spLocks noGrp="1"/>
+          </p:cNvSpPr>
+          <p:nvPr>
+            <p:ph type="sldNum" sz="quarter" idx="5"/>
+          </p:nvPr>
+        </p:nvSpPr>
+        <p:spPr/>
+        <p:txBody>
+          <a:bodyPr/>
+          <a:lstStyle/>
+          <a:p>
+            <a:fld id="{8CE265D3-6F69-46A3-BC22-BD3030E0EBE5}" type="slidenum">
+              <a:rPr lang="de-DE" smtClean="0"/>
+              <a:t>23</a:t>
+            </a:fld>
+            <a:endParaRPr lang="de-DE"/>
+          </a:p>
+        </p:txBody>
+      </p:sp>
+    </p:spTree>
+    <p:extLst>
+      <p:ext uri="{BB962C8B-B14F-4D97-AF65-F5344CB8AC3E}">
+        <p14:creationId xmlns:p14="http://schemas.microsoft.com/office/powerpoint/2010/main" val="3414131590"/>
       </p:ext>
     </p:extLst>
   </p:cSld>
@@ -3162,7 +4950,7 @@
           <a:p>
             <a:fld id="{ED291B17-9318-49DB-B28B-6E5994AE9581}" type="datetime1">
               <a:rPr lang="en-US" smtClean="0"/>
-              <a:t>3/5/2023</a:t>
+              <a:t>3/8/2023</a:t>
             </a:fld>
             <a:endParaRPr lang="en-US" dirty="0"/>
           </a:p>
@@ -3365,7 +5153,7 @@
           <a:p>
             <a:fld id="{2CED4963-E985-44C4-B8C4-FDD613B7C2F8}" type="datetime1">
               <a:rPr lang="en-US" smtClean="0"/>
-              <a:t>3/5/2023</a:t>
+              <a:t>3/8/2023</a:t>
             </a:fld>
             <a:endParaRPr lang="en-US" dirty="0"/>
           </a:p>
@@ -3727,7 +5515,7 @@
           <a:p>
             <a:fld id="{ED291B17-9318-49DB-B28B-6E5994AE9581}" type="datetime1">
               <a:rPr lang="en-US" smtClean="0"/>
-              <a:t>3/5/2023</a:t>
+              <a:t>3/8/2023</a:t>
             </a:fld>
             <a:endParaRPr lang="en-US" dirty="0"/>
           </a:p>
@@ -3925,7 +5713,7 @@
           <a:p>
             <a:fld id="{78DD82B9-B8EE-4375-B6FF-88FA6ABB15D9}" type="datetime1">
               <a:rPr lang="en-US" smtClean="0"/>
-              <a:t>3/5/2023</a:t>
+              <a:t>3/8/2023</a:t>
             </a:fld>
             <a:endParaRPr lang="en-US" dirty="0"/>
           </a:p>
@@ -4237,7 +6025,7 @@
           <a:p>
             <a:fld id="{B2497495-0637-405E-AE64-5CC7506D51F5}" type="datetime1">
               <a:rPr lang="en-US" smtClean="0"/>
-              <a:t>3/5/2023</a:t>
+              <a:t>3/8/2023</a:t>
             </a:fld>
             <a:endParaRPr lang="en-US" dirty="0"/>
           </a:p>
@@ -4490,7 +6278,7 @@
           <a:p>
             <a:fld id="{7BFFD690-9426-415D-8B65-26881E07B2D4}" type="datetime1">
               <a:rPr lang="en-US" smtClean="0"/>
-              <a:t>3/5/2023</a:t>
+              <a:t>3/8/2023</a:t>
             </a:fld>
             <a:endParaRPr lang="en-US" dirty="0"/>
           </a:p>
@@ -4912,7 +6700,7 @@
           <a:p>
             <a:fld id="{04C4989A-474C-40DE-95B9-011C28B71673}" type="datetime1">
               <a:rPr lang="en-US" smtClean="0"/>
-              <a:t>3/5/2023</a:t>
+              <a:t>3/8/2023</a:t>
             </a:fld>
             <a:endParaRPr lang="en-US" dirty="0"/>
           </a:p>
@@ -5035,7 +6823,7 @@
           <a:p>
             <a:fld id="{5DB4ED54-5B5E-4A04-93D3-5772E3CE3818}" type="datetime1">
               <a:rPr lang="en-US" smtClean="0"/>
-              <a:t>3/5/2023</a:t>
+              <a:t>3/8/2023</a:t>
             </a:fld>
             <a:endParaRPr lang="en-US" dirty="0"/>
           </a:p>
@@ -5130,7 +6918,7 @@
           <a:p>
             <a:fld id="{4EDE50D6-574B-40AF-946F-D52A04ADE379}" type="datetime1">
               <a:rPr lang="en-US" smtClean="0"/>
-              <a:t>3/5/2023</a:t>
+              <a:t>3/8/2023</a:t>
             </a:fld>
             <a:endParaRPr lang="en-US" dirty="0"/>
           </a:p>
@@ -5507,7 +7295,7 @@
           <a:p>
             <a:fld id="{D82884F1-FFEA-405F-9602-3DCA865EDA4E}" type="datetime1">
               <a:rPr lang="en-US" smtClean="0"/>
-              <a:t>3/5/2023</a:t>
+              <a:t>3/8/2023</a:t>
             </a:fld>
             <a:endParaRPr lang="en-US" dirty="0"/>
           </a:p>
@@ -5800,7 +7588,7 @@
           <a:p>
             <a:fld id="{7E18DB4A-8810-4A10-AD5C-D5E2C667F5B3}" type="datetime1">
               <a:rPr lang="en-US" smtClean="0"/>
-              <a:t>3/5/2023</a:t>
+              <a:t>3/8/2023</a:t>
             </a:fld>
             <a:endParaRPr lang="en-US" dirty="0"/>
           </a:p>
@@ -6015,7 +7803,7 @@
           <a:p>
             <a:fld id="{ED291B17-9318-49DB-B28B-6E5994AE9581}" type="datetime1">
               <a:rPr lang="en-US" smtClean="0"/>
-              <a:t>3/5/2023</a:t>
+              <a:t>3/8/2023</a:t>
             </a:fld>
             <a:endParaRPr lang="en-US" dirty="0"/>
           </a:p>
@@ -6211,6 +7999,54 @@
             <a:schemeClr val="lt1"/>
           </a:fontRef>
         </p:style>
+      </p:sp>
+      <p:sp>
+        <p:nvSpPr>
+          <p:cNvPr id="7" name="MSIPCMContentMarking" descr="{&quot;HashCode&quot;:758215280,&quot;Placement&quot;:&quot;Header&quot;,&quot;Top&quot;:0.0,&quot;Left&quot;:0.0,&quot;SlideWidth&quot;:960,&quot;SlideHeight&quot;:540}"/>
+          <p:cNvSpPr txBox="1"/>
+          <p:nvPr userDrawn="1"/>
+        </p:nvSpPr>
+        <p:spPr>
+          <a:xfrm>
+            <a:off x="0" y="0"/>
+            <a:ext cx="663105" cy="252360"/>
+          </a:xfrm>
+          <a:prstGeom prst="rect">
+            <a:avLst/>
+          </a:prstGeom>
+          <a:noFill/>
+        </p:spPr>
+        <p:txBody>
+          <a:bodyPr vert="horz" wrap="square" lIns="0" tIns="0" rIns="0" bIns="0" rtlCol="0" anchor="ctr" anchorCtr="1">
+            <a:spAutoFit/>
+          </a:bodyPr>
+          <a:lstStyle/>
+          <a:p>
+            <a:pPr algn="l">
+              <a:spcBef>
+                <a:spcPts val="0"/>
+              </a:spcBef>
+              <a:spcAft>
+                <a:spcPts val="0"/>
+              </a:spcAft>
+            </a:pPr>
+            <a:r>
+              <a:rPr lang="de-DE" sz="1000" smtClean="0">
+                <a:solidFill>
+                  <a:srgbClr val="000000"/>
+                </a:solidFill>
+                <a:latin typeface="CorpoS" pitchFamily="2" charset="0"/>
+              </a:rPr>
+              <a:t>Internal</a:t>
+            </a:r>
+            <a:endParaRPr lang="de-DE" sz="1000">
+              <a:solidFill>
+                <a:srgbClr val="000000"/>
+              </a:solidFill>
+              <a:latin typeface="CorpoS" pitchFamily="2" charset="0"/>
+            </a:endParaRPr>
+          </a:p>
+        </p:txBody>
       </p:sp>
     </p:spTree>
     <p:extLst>
@@ -6675,7 +8511,7 @@
                 <a16:creationId xmlns:a16="http://schemas.microsoft.com/office/drawing/2014/main" id="{26B4480E-B7FF-4481-890E-043A69AE6FE2}"/>
               </a:ext>
               <a:ext uri="{C183D7F6-B498-43B3-948B-1728B52AA6E4}">
-                <adec:decorative xmlns:adec="http://schemas.microsoft.com/office/drawing/2017/decorative" val="1"/>
+                <adec:decorative xmlns:adec="http://schemas.microsoft.com/office/drawing/2017/decorative" xmlns="" val="1"/>
               </a:ext>
             </a:extLst>
           </p:cNvPr>
@@ -6764,7 +8600,7 @@
                 <a16:creationId xmlns:a16="http://schemas.microsoft.com/office/drawing/2014/main" id="{64C13BAB-7C00-4D21-A857-E3D41C0A2A66}"/>
               </a:ext>
               <a:ext uri="{C183D7F6-B498-43B3-948B-1728B52AA6E4}">
-                <adec:decorative xmlns:adec="http://schemas.microsoft.com/office/drawing/2017/decorative" val="1"/>
+                <adec:decorative xmlns:adec="http://schemas.microsoft.com/office/drawing/2017/decorative" xmlns="" val="1"/>
               </a:ext>
             </a:extLst>
           </p:cNvPr>
@@ -6820,7 +8656,7 @@
                 <a16:creationId xmlns:a16="http://schemas.microsoft.com/office/drawing/2014/main" id="{ECA7E90F-7383-4A8D-B3B2-977D30D27076}"/>
               </a:ext>
               <a:ext uri="{C183D7F6-B498-43B3-948B-1728B52AA6E4}">
-                <adec:decorative xmlns:adec="http://schemas.microsoft.com/office/drawing/2017/decorative" val="1"/>
+                <adec:decorative xmlns:adec="http://schemas.microsoft.com/office/drawing/2017/decorative" xmlns="" val="1"/>
               </a:ext>
             </a:extLst>
           </p:cNvPr>
@@ -6876,7 +8712,7 @@
                 <a16:creationId xmlns:a16="http://schemas.microsoft.com/office/drawing/2014/main" id="{1F1FF39A-AC3C-4066-9D4C-519AA22812EA}"/>
               </a:ext>
               <a:ext uri="{C183D7F6-B498-43B3-948B-1728B52AA6E4}">
-                <adec:decorative xmlns:adec="http://schemas.microsoft.com/office/drawing/2017/decorative" val="1"/>
+                <adec:decorative xmlns:adec="http://schemas.microsoft.com/office/drawing/2017/decorative" xmlns="" val="1"/>
               </a:ext>
             </a:extLst>
           </p:cNvPr>
@@ -6932,7 +8768,7 @@
                 <a16:creationId xmlns:a16="http://schemas.microsoft.com/office/drawing/2014/main" id="{153E7C7A-D853-434A-AA24-D8C247D80CCB}"/>
               </a:ext>
               <a:ext uri="{C183D7F6-B498-43B3-948B-1728B52AA6E4}">
-                <adec:decorative xmlns:adec="http://schemas.microsoft.com/office/drawing/2017/decorative" val="1"/>
+                <adec:decorative xmlns:adec="http://schemas.microsoft.com/office/drawing/2017/decorative" xmlns="" val="1"/>
               </a:ext>
             </a:extLst>
           </p:cNvPr>
@@ -7113,6 +8949,186 @@
           <a:p>
             <a:r>
               <a:rPr lang="en-US" dirty="0"/>
+              <a:t>FP Growth – Imbalanced Attributes</a:t>
+            </a:r>
+          </a:p>
+        </p:txBody>
+      </p:sp>
+      <p:pic>
+        <p:nvPicPr>
+          <p:cNvPr id="3" name="Inhaltsplatzhalter 2">
+            <a:extLst>
+              <a:ext uri="{FF2B5EF4-FFF2-40B4-BE49-F238E27FC236}">
+                <a16:creationId xmlns:a16="http://schemas.microsoft.com/office/drawing/2014/main" id="{FB6AFB61-787C-45EC-9B7A-E62800ED1BE5}"/>
+              </a:ext>
+            </a:extLst>
+          </p:cNvPr>
+          <p:cNvPicPr>
+            <a:picLocks noGrp="1" noChangeAspect="1"/>
+          </p:cNvPicPr>
+          <p:nvPr>
+            <p:ph idx="1"/>
+          </p:nvPr>
+        </p:nvPicPr>
+        <p:blipFill>
+          <a:blip r:embed="rId2"/>
+          <a:stretch>
+            <a:fillRect/>
+          </a:stretch>
+        </p:blipFill>
+        <p:spPr>
+          <a:xfrm>
+            <a:off x="3217369" y="1890876"/>
+            <a:ext cx="5757262" cy="4837996"/>
+          </a:xfrm>
+          <a:prstGeom prst="rect">
+            <a:avLst/>
+          </a:prstGeom>
+        </p:spPr>
+      </p:pic>
+    </p:spTree>
+    <p:extLst>
+      <p:ext uri="{BB962C8B-B14F-4D97-AF65-F5344CB8AC3E}">
+        <p14:creationId xmlns:p14="http://schemas.microsoft.com/office/powerpoint/2010/main" val="3385513302"/>
+      </p:ext>
+    </p:extLst>
+  </p:cSld>
+  <p:clrMapOvr>
+    <a:masterClrMapping/>
+  </p:clrMapOvr>
+</p:sld>
+</file>
+
+<file path=ppt/slides/slide11.xml><?xml version="1.0" encoding="utf-8"?>
+<p:sld xmlns:a="http://schemas.openxmlformats.org/drawingml/2006/main" xmlns:r="http://schemas.openxmlformats.org/officeDocument/2006/relationships" xmlns:p="http://schemas.openxmlformats.org/presentationml/2006/main">
+  <p:cSld>
+    <p:spTree>
+      <p:nvGrpSpPr>
+        <p:cNvPr id="1" name=""/>
+        <p:cNvGrpSpPr/>
+        <p:nvPr/>
+      </p:nvGrpSpPr>
+      <p:grpSpPr>
+        <a:xfrm>
+          <a:off x="0" y="0"/>
+          <a:ext cx="0" cy="0"/>
+          <a:chOff x="0" y="0"/>
+          <a:chExt cx="0" cy="0"/>
+        </a:xfrm>
+      </p:grpSpPr>
+      <p:sp>
+        <p:nvSpPr>
+          <p:cNvPr id="2" name="Titel 1">
+            <a:extLst>
+              <a:ext uri="{FF2B5EF4-FFF2-40B4-BE49-F238E27FC236}">
+                <a16:creationId xmlns:a16="http://schemas.microsoft.com/office/drawing/2014/main" id="{06158C18-B0AD-4A23-BB2F-A981A9ADFAF7}"/>
+              </a:ext>
+            </a:extLst>
+          </p:cNvPr>
+          <p:cNvSpPr>
+            <a:spLocks noGrp="1"/>
+          </p:cNvSpPr>
+          <p:nvPr>
+            <p:ph type="title"/>
+          </p:nvPr>
+        </p:nvSpPr>
+        <p:spPr/>
+        <p:txBody>
+          <a:bodyPr/>
+          <a:lstStyle/>
+          <a:p>
+            <a:r>
+              <a:rPr lang="en-US" dirty="0"/>
+              <a:t>FP Growth – Remaining Attributes</a:t>
+            </a:r>
+          </a:p>
+        </p:txBody>
+      </p:sp>
+      <p:pic>
+        <p:nvPicPr>
+          <p:cNvPr id="4" name="Inhaltsplatzhalter 3">
+            <a:extLst>
+              <a:ext uri="{FF2B5EF4-FFF2-40B4-BE49-F238E27FC236}">
+                <a16:creationId xmlns:a16="http://schemas.microsoft.com/office/drawing/2014/main" id="{293B326B-6028-4BEF-8167-4383F16F4DDF}"/>
+              </a:ext>
+            </a:extLst>
+          </p:cNvPr>
+          <p:cNvPicPr>
+            <a:picLocks noGrp="1" noChangeAspect="1"/>
+          </p:cNvPicPr>
+          <p:nvPr>
+            <p:ph idx="1"/>
+          </p:nvPr>
+        </p:nvPicPr>
+        <p:blipFill>
+          <a:blip r:embed="rId2"/>
+          <a:stretch>
+            <a:fillRect/>
+          </a:stretch>
+        </p:blipFill>
+        <p:spPr>
+          <a:xfrm>
+            <a:off x="3455234" y="1890876"/>
+            <a:ext cx="5281532" cy="4629845"/>
+          </a:xfrm>
+          <a:prstGeom prst="rect">
+            <a:avLst/>
+          </a:prstGeom>
+        </p:spPr>
+      </p:pic>
+    </p:spTree>
+    <p:extLst>
+      <p:ext uri="{BB962C8B-B14F-4D97-AF65-F5344CB8AC3E}">
+        <p14:creationId xmlns:p14="http://schemas.microsoft.com/office/powerpoint/2010/main" val="2154687140"/>
+      </p:ext>
+    </p:extLst>
+  </p:cSld>
+  <p:clrMapOvr>
+    <a:masterClrMapping/>
+  </p:clrMapOvr>
+</p:sld>
+</file>
+
+<file path=ppt/slides/slide12.xml><?xml version="1.0" encoding="utf-8"?>
+<p:sld xmlns:a="http://schemas.openxmlformats.org/drawingml/2006/main" xmlns:r="http://schemas.openxmlformats.org/officeDocument/2006/relationships" xmlns:p="http://schemas.openxmlformats.org/presentationml/2006/main">
+  <p:cSld>
+    <p:spTree>
+      <p:nvGrpSpPr>
+        <p:cNvPr id="1" name=""/>
+        <p:cNvGrpSpPr/>
+        <p:nvPr/>
+      </p:nvGrpSpPr>
+      <p:grpSpPr>
+        <a:xfrm>
+          <a:off x="0" y="0"/>
+          <a:ext cx="0" cy="0"/>
+          <a:chOff x="0" y="0"/>
+          <a:chExt cx="0" cy="0"/>
+        </a:xfrm>
+      </p:grpSpPr>
+      <p:sp>
+        <p:nvSpPr>
+          <p:cNvPr id="2" name="Titel 1">
+            <a:extLst>
+              <a:ext uri="{FF2B5EF4-FFF2-40B4-BE49-F238E27FC236}">
+                <a16:creationId xmlns:a16="http://schemas.microsoft.com/office/drawing/2014/main" id="{06158C18-B0AD-4A23-BB2F-A981A9ADFAF7}"/>
+              </a:ext>
+            </a:extLst>
+          </p:cNvPr>
+          <p:cNvSpPr>
+            <a:spLocks noGrp="1"/>
+          </p:cNvSpPr>
+          <p:nvPr>
+            <p:ph type="title"/>
+          </p:nvPr>
+        </p:nvSpPr>
+        <p:spPr/>
+        <p:txBody>
+          <a:bodyPr/>
+          <a:lstStyle/>
+          <a:p>
+            <a:r>
+              <a:rPr lang="en-US" dirty="0"/>
               <a:t>FP Growth – Binning Result</a:t>
             </a:r>
           </a:p>
@@ -7163,7 +9179,7 @@
 </p:sld>
 </file>
 
-<file path=ppt/slides/slide11.xml><?xml version="1.0" encoding="utf-8"?>
+<file path=ppt/slides/slide13.xml><?xml version="1.0" encoding="utf-8"?>
 <p:sld xmlns:a="http://schemas.openxmlformats.org/drawingml/2006/main" xmlns:r="http://schemas.openxmlformats.org/officeDocument/2006/relationships" xmlns:p="http://schemas.openxmlformats.org/presentationml/2006/main">
   <p:cSld>
     <p:spTree>
@@ -7258,7 +9274,7 @@
 </p:sld>
 </file>
 
-<file path=ppt/slides/slide12.xml><?xml version="1.0" encoding="utf-8"?>
+<file path=ppt/slides/slide14.xml><?xml version="1.0" encoding="utf-8"?>
 <p:sld xmlns:a="http://schemas.openxmlformats.org/drawingml/2006/main" xmlns:r="http://schemas.openxmlformats.org/officeDocument/2006/relationships" xmlns:p="http://schemas.openxmlformats.org/presentationml/2006/main">
   <p:cSld>
     <p:spTree>
@@ -7348,7 +9364,7 @@
 </p:sld>
 </file>
 
-<file path=ppt/slides/slide13.xml><?xml version="1.0" encoding="utf-8"?>
+<file path=ppt/slides/slide15.xml><?xml version="1.0" encoding="utf-8"?>
 <p:sld xmlns:a="http://schemas.openxmlformats.org/drawingml/2006/main" xmlns:r="http://schemas.openxmlformats.org/officeDocument/2006/relationships" xmlns:p="http://schemas.openxmlformats.org/presentationml/2006/main">
   <p:cSld>
     <p:spTree>
@@ -7438,7 +9454,7 @@
 </p:sld>
 </file>
 
-<file path=ppt/slides/slide14.xml><?xml version="1.0" encoding="utf-8"?>
+<file path=ppt/slides/slide16.xml><?xml version="1.0" encoding="utf-8"?>
 <p:sld xmlns:a="http://schemas.openxmlformats.org/drawingml/2006/main" xmlns:r="http://schemas.openxmlformats.org/officeDocument/2006/relationships" xmlns:p="http://schemas.openxmlformats.org/presentationml/2006/main">
   <p:cSld>
     <p:spTree>
@@ -7528,7 +9544,7 @@
 </p:sld>
 </file>
 
-<file path=ppt/slides/slide15.xml><?xml version="1.0" encoding="utf-8"?>
+<file path=ppt/slides/slide17.xml><?xml version="1.0" encoding="utf-8"?>
 <p:sld xmlns:a="http://schemas.openxmlformats.org/drawingml/2006/main" xmlns:r="http://schemas.openxmlformats.org/officeDocument/2006/relationships" xmlns:p="http://schemas.openxmlformats.org/presentationml/2006/main">
   <p:cSld>
     <p:spTree>
@@ -7618,7 +9634,7 @@
 </p:sld>
 </file>
 
-<file path=ppt/slides/slide16.xml><?xml version="1.0" encoding="utf-8"?>
+<file path=ppt/slides/slide18.xml><?xml version="1.0" encoding="utf-8"?>
 <p:sld xmlns:a="http://schemas.openxmlformats.org/drawingml/2006/main" xmlns:r="http://schemas.openxmlformats.org/officeDocument/2006/relationships" xmlns:p="http://schemas.openxmlformats.org/presentationml/2006/main">
   <p:cSld>
     <p:spTree>
@@ -7692,6 +9708,79 @@
     <p:extLst>
       <p:ext uri="{BB962C8B-B14F-4D97-AF65-F5344CB8AC3E}">
         <p14:creationId xmlns:p14="http://schemas.microsoft.com/office/powerpoint/2010/main" val="4279545342"/>
+      </p:ext>
+    </p:extLst>
+  </p:cSld>
+  <p:clrMapOvr>
+    <a:masterClrMapping/>
+  </p:clrMapOvr>
+</p:sld>
+</file>
+
+<file path=ppt/slides/slide19.xml><?xml version="1.0" encoding="utf-8"?>
+<p:sld xmlns:a="http://schemas.openxmlformats.org/drawingml/2006/main" xmlns:r="http://schemas.openxmlformats.org/officeDocument/2006/relationships" xmlns:p="http://schemas.openxmlformats.org/presentationml/2006/main">
+  <p:cSld>
+    <p:spTree>
+      <p:nvGrpSpPr>
+        <p:cNvPr id="1" name=""/>
+        <p:cNvGrpSpPr/>
+        <p:nvPr/>
+      </p:nvGrpSpPr>
+      <p:grpSpPr>
+        <a:xfrm>
+          <a:off x="0" y="0"/>
+          <a:ext cx="0" cy="0"/>
+          <a:chOff x="0" y="0"/>
+          <a:chExt cx="0" cy="0"/>
+        </a:xfrm>
+      </p:grpSpPr>
+      <p:sp>
+        <p:nvSpPr>
+          <p:cNvPr id="2" name="Titel 1"/>
+          <p:cNvSpPr>
+            <a:spLocks noGrp="1"/>
+          </p:cNvSpPr>
+          <p:nvPr>
+            <p:ph type="title"/>
+          </p:nvPr>
+        </p:nvSpPr>
+        <p:spPr/>
+        <p:txBody>
+          <a:bodyPr/>
+          <a:lstStyle/>
+          <a:p>
+            <a:r>
+              <a:rPr lang="en-GB" dirty="0" smtClean="0"/>
+              <a:t>Random forest is the best performing model</a:t>
+            </a:r>
+            <a:endParaRPr lang="en-GB" dirty="0"/>
+          </a:p>
+        </p:txBody>
+      </p:sp>
+      <p:graphicFrame>
+        <p:nvGraphicFramePr>
+          <p:cNvPr id="14" name="Inhaltsplatzhalter 13"/>
+          <p:cNvGraphicFramePr>
+            <a:graphicFrameLocks noGrp="1"/>
+          </p:cNvGraphicFramePr>
+          <p:nvPr>
+            <p:ph idx="1"/>
+          </p:nvPr>
+        </p:nvGraphicFramePr>
+        <p:xfrm>
+          <a:off x="581025" y="2341563"/>
+          <a:ext cx="11029950" cy="3633787"/>
+        </p:xfrm>
+        <a:graphic>
+          <a:graphicData uri="http://schemas.openxmlformats.org/drawingml/2006/chart">
+            <c:chart xmlns:c="http://schemas.openxmlformats.org/drawingml/2006/chart" xmlns:r="http://schemas.openxmlformats.org/officeDocument/2006/relationships" r:id="rId2"/>
+          </a:graphicData>
+        </a:graphic>
+      </p:graphicFrame>
+    </p:spTree>
+    <p:extLst>
+      <p:ext uri="{BB962C8B-B14F-4D97-AF65-F5344CB8AC3E}">
+        <p14:creationId xmlns:p14="http://schemas.microsoft.com/office/powerpoint/2010/main" val="3213923480"/>
       </p:ext>
     </p:extLst>
   </p:cSld>
@@ -7872,7 +9961,1219 @@
 </p:sld>
 </file>
 
+<file path=ppt/slides/slide20.xml><?xml version="1.0" encoding="utf-8"?>
+<p:sld xmlns:a="http://schemas.openxmlformats.org/drawingml/2006/main" xmlns:r="http://schemas.openxmlformats.org/officeDocument/2006/relationships" xmlns:p="http://schemas.openxmlformats.org/presentationml/2006/main">
+  <p:cSld>
+    <p:spTree>
+      <p:nvGrpSpPr>
+        <p:cNvPr id="1" name=""/>
+        <p:cNvGrpSpPr/>
+        <p:nvPr/>
+      </p:nvGrpSpPr>
+      <p:grpSpPr>
+        <a:xfrm>
+          <a:off x="0" y="0"/>
+          <a:ext cx="0" cy="0"/>
+          <a:chOff x="0" y="0"/>
+          <a:chExt cx="0" cy="0"/>
+        </a:xfrm>
+      </p:grpSpPr>
+      <p:sp>
+        <p:nvSpPr>
+          <p:cNvPr id="2" name="Titel 1">
+            <a:extLst>
+              <a:ext uri="{FF2B5EF4-FFF2-40B4-BE49-F238E27FC236}">
+                <a16:creationId xmlns:a16="http://schemas.microsoft.com/office/drawing/2014/main" id="{7DDADCD2-B8D4-5A6A-3E1E-EE847B1B9460}"/>
+              </a:ext>
+            </a:extLst>
+          </p:cNvPr>
+          <p:cNvSpPr>
+            <a:spLocks noGrp="1"/>
+          </p:cNvSpPr>
+          <p:nvPr>
+            <p:ph type="title"/>
+          </p:nvPr>
+        </p:nvSpPr>
+        <p:spPr/>
+        <p:txBody>
+          <a:bodyPr/>
+          <a:lstStyle/>
+          <a:p>
+            <a:r>
+              <a:rPr lang="en-US" dirty="0" smtClean="0"/>
+              <a:t>Reflection</a:t>
+            </a:r>
+            <a:endParaRPr lang="en-US" dirty="0"/>
+          </a:p>
+        </p:txBody>
+      </p:sp>
+      <p:sp>
+        <p:nvSpPr>
+          <p:cNvPr id="3" name="Inhaltsplatzhalter 2">
+            <a:extLst>
+              <a:ext uri="{FF2B5EF4-FFF2-40B4-BE49-F238E27FC236}">
+                <a16:creationId xmlns:a16="http://schemas.microsoft.com/office/drawing/2014/main" id="{4C5B23D1-4460-1C14-E6C7-82AD986954D0}"/>
+              </a:ext>
+            </a:extLst>
+          </p:cNvPr>
+          <p:cNvSpPr>
+            <a:spLocks noGrp="1"/>
+          </p:cNvSpPr>
+          <p:nvPr>
+            <p:ph idx="1"/>
+          </p:nvPr>
+        </p:nvSpPr>
+        <p:spPr>
+          <a:xfrm>
+            <a:off x="581193" y="2238376"/>
+            <a:ext cx="11029615" cy="4362162"/>
+          </a:xfrm>
+        </p:spPr>
+        <p:txBody>
+          <a:bodyPr>
+            <a:normAutofit/>
+          </a:bodyPr>
+          <a:lstStyle/>
+          <a:p>
+            <a:pPr marL="0" indent="0">
+              <a:buNone/>
+            </a:pPr>
+            <a:endParaRPr lang="en-GB" dirty="0" smtClean="0"/>
+          </a:p>
+          <a:p>
+            <a:r>
+              <a:rPr lang="en-GB" b="1" dirty="0" smtClean="0"/>
+              <a:t>Genre:</a:t>
+            </a:r>
+            <a:r>
+              <a:rPr lang="en-GB" dirty="0" smtClean="0"/>
+              <a:t> We did not differentiate between different genres, an improvement could be to research top songs in different genres separately (</a:t>
+            </a:r>
+            <a:r>
+              <a:rPr lang="en-GB" dirty="0" err="1" smtClean="0"/>
+              <a:t>e.g</a:t>
+            </a:r>
+            <a:r>
+              <a:rPr lang="en-GB" dirty="0" smtClean="0"/>
+              <a:t> pop, rock, rap,…) </a:t>
+            </a:r>
+          </a:p>
+          <a:p>
+            <a:pPr lvl="1">
+              <a:buFont typeface="Wingdings" panose="05000000000000000000" pitchFamily="2" charset="2"/>
+              <a:buChar char="à"/>
+            </a:pPr>
+            <a:r>
+              <a:rPr lang="en-GB" dirty="0" smtClean="0">
+                <a:sym typeface="Wingdings" panose="05000000000000000000" pitchFamily="2" charset="2"/>
+              </a:rPr>
+              <a:t>Our datasets where not sufficient for those kind of research there where too special and too much genres (</a:t>
+            </a:r>
+            <a:r>
+              <a:rPr lang="en-GB" dirty="0" err="1" smtClean="0">
+                <a:sym typeface="Wingdings" panose="05000000000000000000" pitchFamily="2" charset="2"/>
+              </a:rPr>
+              <a:t>e.g</a:t>
+            </a:r>
+            <a:r>
+              <a:rPr lang="en-GB" dirty="0" smtClean="0">
+                <a:sym typeface="Wingdings" panose="05000000000000000000" pitchFamily="2" charset="2"/>
+              </a:rPr>
+              <a:t> Greek pop, Japanese R&amp;B,..) </a:t>
+            </a:r>
+            <a:endParaRPr lang="en-GB" dirty="0" smtClean="0"/>
+          </a:p>
+          <a:p>
+            <a:r>
+              <a:rPr lang="en-GB" b="1" dirty="0" smtClean="0"/>
+              <a:t>Time:</a:t>
+            </a:r>
+            <a:r>
+              <a:rPr lang="en-GB" dirty="0" smtClean="0"/>
+              <a:t> We could also made a time series analysis. In our model we do not take into account if there where also trends during the different years or decades. Also seasonal differences could be interesting (e.g. Christmas songs, beach songs)</a:t>
+            </a:r>
+          </a:p>
+          <a:p>
+            <a:r>
+              <a:rPr lang="en-GB" dirty="0" smtClean="0"/>
+              <a:t>We find out that the </a:t>
+            </a:r>
+            <a:r>
+              <a:rPr lang="en-GB" b="1" dirty="0" smtClean="0"/>
+              <a:t>popularity factor </a:t>
+            </a:r>
+            <a:r>
+              <a:rPr lang="en-GB" dirty="0" smtClean="0"/>
+              <a:t>increases a lot if the artist are recommended by popular artist, but we </a:t>
+            </a:r>
+            <a:r>
+              <a:rPr lang="en-GB" dirty="0"/>
+              <a:t>s</a:t>
+            </a:r>
+            <a:r>
+              <a:rPr lang="en-GB" dirty="0" smtClean="0"/>
+              <a:t>till don´t know how the factor of recommendations are built. We could investigate in that fact more. What are the factors that a song is listed as a recommended song?</a:t>
+            </a:r>
+          </a:p>
+          <a:p>
+            <a:endParaRPr lang="en-GB" dirty="0" smtClean="0"/>
+          </a:p>
+          <a:p>
+            <a:endParaRPr lang="en-GB" dirty="0" smtClean="0"/>
+          </a:p>
+          <a:p>
+            <a:endParaRPr lang="en-GB" dirty="0" smtClean="0"/>
+          </a:p>
+          <a:p>
+            <a:endParaRPr lang="en-GB" dirty="0"/>
+          </a:p>
+        </p:txBody>
+      </p:sp>
+    </p:spTree>
+    <p:extLst>
+      <p:ext uri="{BB962C8B-B14F-4D97-AF65-F5344CB8AC3E}">
+        <p14:creationId xmlns:p14="http://schemas.microsoft.com/office/powerpoint/2010/main" val="1613836996"/>
+      </p:ext>
+    </p:extLst>
+  </p:cSld>
+  <p:clrMapOvr>
+    <a:masterClrMapping/>
+  </p:clrMapOvr>
+</p:sld>
+</file>
+
+<file path=ppt/slides/slide21.xml><?xml version="1.0" encoding="utf-8"?>
+<p:sld xmlns:a="http://schemas.openxmlformats.org/drawingml/2006/main" xmlns:r="http://schemas.openxmlformats.org/officeDocument/2006/relationships" xmlns:p="http://schemas.openxmlformats.org/presentationml/2006/main">
+  <p:cSld>
+    <p:spTree>
+      <p:nvGrpSpPr>
+        <p:cNvPr id="1" name=""/>
+        <p:cNvGrpSpPr/>
+        <p:nvPr/>
+      </p:nvGrpSpPr>
+      <p:grpSpPr>
+        <a:xfrm>
+          <a:off x="0" y="0"/>
+          <a:ext cx="0" cy="0"/>
+          <a:chOff x="0" y="0"/>
+          <a:chExt cx="0" cy="0"/>
+        </a:xfrm>
+      </p:grpSpPr>
+      <p:sp>
+        <p:nvSpPr>
+          <p:cNvPr id="2" name="Titel 1">
+            <a:extLst>
+              <a:ext uri="{FF2B5EF4-FFF2-40B4-BE49-F238E27FC236}">
+                <a16:creationId xmlns:a16="http://schemas.microsoft.com/office/drawing/2014/main" id="{7DDADCD2-B8D4-5A6A-3E1E-EE847B1B9460}"/>
+              </a:ext>
+            </a:extLst>
+          </p:cNvPr>
+          <p:cNvSpPr>
+            <a:spLocks noGrp="1"/>
+          </p:cNvSpPr>
+          <p:nvPr>
+            <p:ph type="title"/>
+          </p:nvPr>
+        </p:nvSpPr>
+        <p:spPr/>
+        <p:txBody>
+          <a:bodyPr/>
+          <a:lstStyle/>
+          <a:p>
+            <a:r>
+              <a:rPr lang="en-US" dirty="0" smtClean="0"/>
+              <a:t>Reflection</a:t>
+            </a:r>
+            <a:endParaRPr lang="en-US" dirty="0"/>
+          </a:p>
+        </p:txBody>
+      </p:sp>
+      <p:sp>
+        <p:nvSpPr>
+          <p:cNvPr id="3" name="Inhaltsplatzhalter 2">
+            <a:extLst>
+              <a:ext uri="{FF2B5EF4-FFF2-40B4-BE49-F238E27FC236}">
+                <a16:creationId xmlns:a16="http://schemas.microsoft.com/office/drawing/2014/main" id="{4C5B23D1-4460-1C14-E6C7-82AD986954D0}"/>
+              </a:ext>
+            </a:extLst>
+          </p:cNvPr>
+          <p:cNvSpPr>
+            <a:spLocks noGrp="1"/>
+          </p:cNvSpPr>
+          <p:nvPr>
+            <p:ph idx="1"/>
+          </p:nvPr>
+        </p:nvSpPr>
+        <p:spPr>
+          <a:xfrm>
+            <a:off x="581193" y="2238376"/>
+            <a:ext cx="11029615" cy="4362162"/>
+          </a:xfrm>
+        </p:spPr>
+        <p:txBody>
+          <a:bodyPr anchor="t">
+            <a:normAutofit/>
+          </a:bodyPr>
+          <a:lstStyle/>
+          <a:p>
+            <a:r>
+              <a:rPr lang="en-GB" dirty="0" smtClean="0"/>
+              <a:t>We </a:t>
+            </a:r>
+            <a:r>
+              <a:rPr lang="en-GB" dirty="0"/>
+              <a:t>could also investigate more into clustering in different </a:t>
+            </a:r>
+            <a:r>
+              <a:rPr lang="en-GB" b="1" dirty="0"/>
+              <a:t>countries. </a:t>
+            </a:r>
+          </a:p>
+          <a:p>
+            <a:pPr lvl="1">
+              <a:buFont typeface="Wingdings" panose="05000000000000000000" pitchFamily="2" charset="2"/>
+              <a:buChar char="à"/>
+            </a:pPr>
+            <a:r>
+              <a:rPr lang="en-GB" sz="1600" dirty="0"/>
+              <a:t>We started to do that and clustered charts in Regions and saw differences between different countries in accuracy for example but overall the results were not really good. We would need more data to have a reliable model.</a:t>
+            </a:r>
+          </a:p>
+          <a:p>
+            <a:endParaRPr lang="en-GB" dirty="0" smtClean="0"/>
+          </a:p>
+          <a:p>
+            <a:endParaRPr lang="en-GB" dirty="0" smtClean="0"/>
+          </a:p>
+          <a:p>
+            <a:endParaRPr lang="en-GB" dirty="0" smtClean="0"/>
+          </a:p>
+          <a:p>
+            <a:endParaRPr lang="en-GB" dirty="0"/>
+          </a:p>
+        </p:txBody>
+      </p:sp>
+      <p:pic>
+        <p:nvPicPr>
+          <p:cNvPr id="4" name="Inhaltsplatzhalter 3"/>
+          <p:cNvPicPr>
+            <a:picLocks noChangeAspect="1"/>
+          </p:cNvPicPr>
+          <p:nvPr/>
+        </p:nvPicPr>
+        <p:blipFill rotWithShape="1">
+          <a:blip r:embed="rId3"/>
+          <a:srcRect b="15060"/>
+          <a:stretch/>
+        </p:blipFill>
+        <p:spPr>
+          <a:xfrm>
+            <a:off x="866942" y="3390451"/>
+            <a:ext cx="3573425" cy="3086549"/>
+          </a:xfrm>
+          <a:prstGeom prst="rect">
+            <a:avLst/>
+          </a:prstGeom>
+        </p:spPr>
+      </p:pic>
+    </p:spTree>
+    <p:extLst>
+      <p:ext uri="{BB962C8B-B14F-4D97-AF65-F5344CB8AC3E}">
+        <p14:creationId xmlns:p14="http://schemas.microsoft.com/office/powerpoint/2010/main" val="1857577151"/>
+      </p:ext>
+    </p:extLst>
+  </p:cSld>
+  <p:clrMapOvr>
+    <a:masterClrMapping/>
+  </p:clrMapOvr>
+</p:sld>
+</file>
+
+<file path=ppt/slides/slide22.xml><?xml version="1.0" encoding="utf-8"?>
+<p:sld xmlns:a="http://schemas.openxmlformats.org/drawingml/2006/main" xmlns:r="http://schemas.openxmlformats.org/officeDocument/2006/relationships" xmlns:p="http://schemas.openxmlformats.org/presentationml/2006/main">
+  <p:cSld>
+    <p:spTree>
+      <p:nvGrpSpPr>
+        <p:cNvPr id="1" name=""/>
+        <p:cNvGrpSpPr/>
+        <p:nvPr/>
+      </p:nvGrpSpPr>
+      <p:grpSpPr>
+        <a:xfrm>
+          <a:off x="0" y="0"/>
+          <a:ext cx="0" cy="0"/>
+          <a:chOff x="0" y="0"/>
+          <a:chExt cx="0" cy="0"/>
+        </a:xfrm>
+      </p:grpSpPr>
+      <p:sp>
+        <p:nvSpPr>
+          <p:cNvPr id="2" name="Titel 1">
+            <a:extLst>
+              <a:ext uri="{FF2B5EF4-FFF2-40B4-BE49-F238E27FC236}">
+                <a16:creationId xmlns:a16="http://schemas.microsoft.com/office/drawing/2014/main" id="{7DDADCD2-B8D4-5A6A-3E1E-EE847B1B9460}"/>
+              </a:ext>
+            </a:extLst>
+          </p:cNvPr>
+          <p:cNvSpPr>
+            <a:spLocks noGrp="1"/>
+          </p:cNvSpPr>
+          <p:nvPr>
+            <p:ph type="title"/>
+          </p:nvPr>
+        </p:nvSpPr>
+        <p:spPr/>
+        <p:txBody>
+          <a:bodyPr>
+            <a:normAutofit/>
+          </a:bodyPr>
+          <a:lstStyle/>
+          <a:p>
+            <a:r>
+              <a:rPr lang="en-US" dirty="0" smtClean="0"/>
+              <a:t>Reflection </a:t>
+            </a:r>
+            <a:br>
+              <a:rPr lang="en-US" dirty="0" smtClean="0"/>
+            </a:br>
+            <a:r>
+              <a:rPr lang="en-US" dirty="0" smtClean="0"/>
+              <a:t>possible improvements in current Model setting</a:t>
+            </a:r>
+            <a:endParaRPr lang="en-US" dirty="0"/>
+          </a:p>
+        </p:txBody>
+      </p:sp>
+      <p:sp>
+        <p:nvSpPr>
+          <p:cNvPr id="3" name="Inhaltsplatzhalter 2">
+            <a:extLst>
+              <a:ext uri="{FF2B5EF4-FFF2-40B4-BE49-F238E27FC236}">
+                <a16:creationId xmlns:a16="http://schemas.microsoft.com/office/drawing/2014/main" id="{4C5B23D1-4460-1C14-E6C7-82AD986954D0}"/>
+              </a:ext>
+            </a:extLst>
+          </p:cNvPr>
+          <p:cNvSpPr>
+            <a:spLocks noGrp="1"/>
+          </p:cNvSpPr>
+          <p:nvPr>
+            <p:ph idx="1"/>
+          </p:nvPr>
+        </p:nvSpPr>
+        <p:spPr>
+          <a:xfrm>
+            <a:off x="581192" y="2108429"/>
+            <a:ext cx="11029615" cy="3634486"/>
+          </a:xfrm>
+        </p:spPr>
+        <p:txBody>
+          <a:bodyPr anchor="t">
+            <a:normAutofit/>
+          </a:bodyPr>
+          <a:lstStyle/>
+          <a:p>
+            <a:r>
+              <a:rPr lang="en-GB" sz="1800" dirty="0" smtClean="0"/>
+              <a:t>Test/Split data: We choose the 0.8/02. ratio. To improve our model we could also try it with even more or less </a:t>
+            </a:r>
+            <a:r>
+              <a:rPr lang="en-GB" sz="1800" dirty="0" err="1" smtClean="0"/>
+              <a:t>traing</a:t>
+            </a:r>
+            <a:r>
+              <a:rPr lang="en-GB" sz="1800" dirty="0" smtClean="0"/>
+              <a:t> data.</a:t>
+            </a:r>
+          </a:p>
+          <a:p>
+            <a:endParaRPr lang="en-GB" dirty="0" smtClean="0"/>
+          </a:p>
+          <a:p>
+            <a:endParaRPr lang="en-GB" dirty="0" smtClean="0"/>
+          </a:p>
+          <a:p>
+            <a:endParaRPr lang="en-GB" dirty="0" smtClean="0"/>
+          </a:p>
+          <a:p>
+            <a:endParaRPr lang="en-GB" dirty="0" smtClean="0"/>
+          </a:p>
+          <a:p>
+            <a:endParaRPr lang="en-GB" dirty="0" smtClean="0"/>
+          </a:p>
+          <a:p>
+            <a:endParaRPr lang="en-GB" dirty="0" smtClean="0"/>
+          </a:p>
+          <a:p>
+            <a:endParaRPr lang="en-GB" dirty="0" smtClean="0"/>
+          </a:p>
+          <a:p>
+            <a:endParaRPr lang="en-GB" dirty="0" smtClean="0"/>
+          </a:p>
+          <a:p>
+            <a:endParaRPr lang="en-GB" dirty="0"/>
+          </a:p>
+        </p:txBody>
+      </p:sp>
+      <p:sp>
+        <p:nvSpPr>
+          <p:cNvPr id="8" name="Inhaltsplatzhalter 7"/>
+          <p:cNvSpPr>
+            <a:spLocks noGrp="1"/>
+          </p:cNvSpPr>
+          <p:nvPr>
+            <p:ph sz="half" idx="4294967295"/>
+          </p:nvPr>
+        </p:nvSpPr>
+        <p:spPr>
+          <a:xfrm>
+            <a:off x="674770" y="4632713"/>
+            <a:ext cx="10842457" cy="3633787"/>
+          </a:xfrm>
+        </p:spPr>
+        <p:txBody>
+          <a:bodyPr anchor="t">
+            <a:normAutofit/>
+          </a:bodyPr>
+          <a:lstStyle/>
+          <a:p>
+            <a:r>
+              <a:rPr lang="en-GB" sz="1800" dirty="0"/>
+              <a:t>Sampling: We select 6000 true </a:t>
+            </a:r>
+            <a:r>
+              <a:rPr lang="en-GB" sz="1800" dirty="0" err="1"/>
+              <a:t>topsongs</a:t>
+            </a:r>
+            <a:r>
+              <a:rPr lang="en-GB" sz="1800" dirty="0"/>
+              <a:t> and 6000 false </a:t>
+            </a:r>
+            <a:r>
+              <a:rPr lang="en-GB" sz="1800" dirty="0" err="1"/>
+              <a:t>topsongs</a:t>
+            </a:r>
+            <a:r>
+              <a:rPr lang="en-GB" sz="1800" dirty="0"/>
+              <a:t> random and manually. Is there a way in </a:t>
+            </a:r>
+            <a:r>
+              <a:rPr lang="en-GB" sz="1800" dirty="0" err="1"/>
+              <a:t>Rapidminer</a:t>
+            </a:r>
+            <a:r>
+              <a:rPr lang="en-GB" sz="1800" dirty="0"/>
+              <a:t> to sample automatically? </a:t>
+            </a:r>
+          </a:p>
+          <a:p>
+            <a:endParaRPr lang="de-DE" dirty="0"/>
+          </a:p>
+        </p:txBody>
+      </p:sp>
+      <p:pic>
+        <p:nvPicPr>
+          <p:cNvPr id="4" name="Grafik 3"/>
+          <p:cNvPicPr>
+            <a:picLocks noChangeAspect="1"/>
+          </p:cNvPicPr>
+          <p:nvPr/>
+        </p:nvPicPr>
+        <p:blipFill rotWithShape="1">
+          <a:blip r:embed="rId3"/>
+          <a:srcRect t="5472" b="372"/>
+          <a:stretch/>
+        </p:blipFill>
+        <p:spPr>
+          <a:xfrm>
+            <a:off x="909059" y="5379443"/>
+            <a:ext cx="8410575" cy="1381125"/>
+          </a:xfrm>
+          <a:prstGeom prst="rect">
+            <a:avLst/>
+          </a:prstGeom>
+        </p:spPr>
+      </p:pic>
+      <p:pic>
+        <p:nvPicPr>
+          <p:cNvPr id="5" name="Grafik 4"/>
+          <p:cNvPicPr>
+            <a:picLocks noChangeAspect="1"/>
+          </p:cNvPicPr>
+          <p:nvPr/>
+        </p:nvPicPr>
+        <p:blipFill>
+          <a:blip r:embed="rId4"/>
+          <a:stretch>
+            <a:fillRect/>
+          </a:stretch>
+        </p:blipFill>
+        <p:spPr>
+          <a:xfrm>
+            <a:off x="909059" y="2908460"/>
+            <a:ext cx="5101216" cy="1573595"/>
+          </a:xfrm>
+          <a:prstGeom prst="rect">
+            <a:avLst/>
+          </a:prstGeom>
+        </p:spPr>
+      </p:pic>
+    </p:spTree>
+    <p:extLst>
+      <p:ext uri="{BB962C8B-B14F-4D97-AF65-F5344CB8AC3E}">
+        <p14:creationId xmlns:p14="http://schemas.microsoft.com/office/powerpoint/2010/main" val="814394918"/>
+      </p:ext>
+    </p:extLst>
+  </p:cSld>
+  <p:clrMapOvr>
+    <a:masterClrMapping/>
+  </p:clrMapOvr>
+</p:sld>
+</file>
+
+<file path=ppt/slides/slide23.xml><?xml version="1.0" encoding="utf-8"?>
+<p:sld xmlns:a="http://schemas.openxmlformats.org/drawingml/2006/main" xmlns:r="http://schemas.openxmlformats.org/officeDocument/2006/relationships" xmlns:p="http://schemas.openxmlformats.org/presentationml/2006/main">
+  <p:cSld>
+    <p:spTree>
+      <p:nvGrpSpPr>
+        <p:cNvPr id="1" name=""/>
+        <p:cNvGrpSpPr/>
+        <p:nvPr/>
+      </p:nvGrpSpPr>
+      <p:grpSpPr>
+        <a:xfrm>
+          <a:off x="0" y="0"/>
+          <a:ext cx="0" cy="0"/>
+          <a:chOff x="0" y="0"/>
+          <a:chExt cx="0" cy="0"/>
+        </a:xfrm>
+      </p:grpSpPr>
+      <p:sp>
+        <p:nvSpPr>
+          <p:cNvPr id="2" name="Titel 1">
+            <a:extLst>
+              <a:ext uri="{FF2B5EF4-FFF2-40B4-BE49-F238E27FC236}">
+                <a16:creationId xmlns:a16="http://schemas.microsoft.com/office/drawing/2014/main" id="{7DDADCD2-B8D4-5A6A-3E1E-EE847B1B9460}"/>
+              </a:ext>
+            </a:extLst>
+          </p:cNvPr>
+          <p:cNvSpPr>
+            <a:spLocks noGrp="1"/>
+          </p:cNvSpPr>
+          <p:nvPr>
+            <p:ph type="title"/>
+          </p:nvPr>
+        </p:nvSpPr>
+        <p:spPr/>
+        <p:txBody>
+          <a:bodyPr/>
+          <a:lstStyle/>
+          <a:p>
+            <a:r>
+              <a:rPr lang="en-US" dirty="0" smtClean="0"/>
+              <a:t>c0nclusion</a:t>
+            </a:r>
+            <a:endParaRPr lang="en-US" dirty="0"/>
+          </a:p>
+        </p:txBody>
+      </p:sp>
+      <p:sp>
+        <p:nvSpPr>
+          <p:cNvPr id="3" name="Inhaltsplatzhalter 2">
+            <a:extLst>
+              <a:ext uri="{FF2B5EF4-FFF2-40B4-BE49-F238E27FC236}">
+                <a16:creationId xmlns:a16="http://schemas.microsoft.com/office/drawing/2014/main" id="{4C5B23D1-4460-1C14-E6C7-82AD986954D0}"/>
+              </a:ext>
+            </a:extLst>
+          </p:cNvPr>
+          <p:cNvSpPr>
+            <a:spLocks noGrp="1"/>
+          </p:cNvSpPr>
+          <p:nvPr>
+            <p:ph idx="1"/>
+          </p:nvPr>
+        </p:nvSpPr>
+        <p:spPr>
+          <a:xfrm>
+            <a:off x="581192" y="2161310"/>
+            <a:ext cx="11029615" cy="3924877"/>
+          </a:xfrm>
+        </p:spPr>
+        <p:txBody>
+          <a:bodyPr>
+            <a:normAutofit/>
+          </a:bodyPr>
+          <a:lstStyle/>
+          <a:p>
+            <a:pPr marL="0" indent="0">
+              <a:buNone/>
+            </a:pPr>
+            <a:r>
+              <a:rPr lang="en-US" dirty="0"/>
+              <a:t>It's </a:t>
+            </a:r>
+            <a:r>
+              <a:rPr lang="en-US" dirty="0" smtClean="0"/>
+              <a:t>important to </a:t>
+            </a:r>
+            <a:r>
+              <a:rPr lang="en-US" dirty="0"/>
+              <a:t>note that predicting music </a:t>
+            </a:r>
+            <a:r>
+              <a:rPr lang="en-US" dirty="0" smtClean="0"/>
+              <a:t>popularity/top song </a:t>
+            </a:r>
+            <a:r>
+              <a:rPr lang="en-US" dirty="0"/>
+              <a:t>is not an exact science, and there are many factors that can influence </a:t>
+            </a:r>
+            <a:r>
+              <a:rPr lang="en-US" dirty="0" smtClean="0"/>
+              <a:t>the </a:t>
+            </a:r>
+            <a:r>
+              <a:rPr lang="en-US" dirty="0"/>
+              <a:t>success of a song, such as </a:t>
+            </a:r>
+            <a:r>
+              <a:rPr lang="en-US" b="1" dirty="0"/>
+              <a:t>marketing, promotion, and timing</a:t>
+            </a:r>
+            <a:r>
+              <a:rPr lang="en-US" dirty="0"/>
+              <a:t>. Nonetheless, by using data and machine learning algorithms, it's possible to identify songs that have a </a:t>
+            </a:r>
+            <a:r>
+              <a:rPr lang="en-US" b="1" dirty="0"/>
+              <a:t>higher probability </a:t>
+            </a:r>
+            <a:r>
+              <a:rPr lang="en-US" dirty="0"/>
+              <a:t>of becoming </a:t>
+            </a:r>
+            <a:r>
+              <a:rPr lang="en-US" dirty="0" smtClean="0"/>
+              <a:t>popular/top song, </a:t>
+            </a:r>
+            <a:r>
+              <a:rPr lang="en-US" dirty="0"/>
+              <a:t>and to make informed decisions based on that prediction.</a:t>
+            </a:r>
+            <a:endParaRPr lang="en-GB" dirty="0" smtClean="0"/>
+          </a:p>
+          <a:p>
+            <a:endParaRPr lang="en-GB" dirty="0" smtClean="0"/>
+          </a:p>
+          <a:p>
+            <a:endParaRPr lang="en-GB" dirty="0" smtClean="0"/>
+          </a:p>
+          <a:p>
+            <a:endParaRPr lang="en-GB" dirty="0"/>
+          </a:p>
+        </p:txBody>
+      </p:sp>
+    </p:spTree>
+    <p:extLst>
+      <p:ext uri="{BB962C8B-B14F-4D97-AF65-F5344CB8AC3E}">
+        <p14:creationId xmlns:p14="http://schemas.microsoft.com/office/powerpoint/2010/main" val="3518133419"/>
+      </p:ext>
+    </p:extLst>
+  </p:cSld>
+  <p:clrMapOvr>
+    <a:masterClrMapping/>
+  </p:clrMapOvr>
+</p:sld>
+</file>
+
 <file path=ppt/slides/slide3.xml><?xml version="1.0" encoding="utf-8"?>
+<p:sld xmlns:a="http://schemas.openxmlformats.org/drawingml/2006/main" xmlns:r="http://schemas.openxmlformats.org/officeDocument/2006/relationships" xmlns:p="http://schemas.openxmlformats.org/presentationml/2006/main">
+  <p:cSld>
+    <p:spTree>
+      <p:nvGrpSpPr>
+        <p:cNvPr id="1" name=""/>
+        <p:cNvGrpSpPr/>
+        <p:nvPr/>
+      </p:nvGrpSpPr>
+      <p:grpSpPr>
+        <a:xfrm>
+          <a:off x="0" y="0"/>
+          <a:ext cx="0" cy="0"/>
+          <a:chOff x="0" y="0"/>
+          <a:chExt cx="0" cy="0"/>
+        </a:xfrm>
+      </p:grpSpPr>
+      <p:sp>
+        <p:nvSpPr>
+          <p:cNvPr id="2" name="Titel 1"/>
+          <p:cNvSpPr>
+            <a:spLocks noGrp="1"/>
+          </p:cNvSpPr>
+          <p:nvPr>
+            <p:ph type="title"/>
+          </p:nvPr>
+        </p:nvSpPr>
+        <p:spPr/>
+        <p:txBody>
+          <a:bodyPr anchor="ctr">
+            <a:normAutofit fontScale="90000"/>
+          </a:bodyPr>
+          <a:lstStyle/>
+          <a:p>
+            <a:r>
+              <a:rPr lang="de-DE" dirty="0" smtClean="0"/>
+              <a:t/>
+            </a:r>
+            <a:br>
+              <a:rPr lang="de-DE" dirty="0" smtClean="0"/>
+            </a:br>
+            <a:r>
+              <a:rPr lang="de-DE" dirty="0"/>
+              <a:t/>
+            </a:r>
+            <a:br>
+              <a:rPr lang="de-DE" dirty="0"/>
+            </a:br>
+            <a:r>
+              <a:rPr lang="de-DE" dirty="0" smtClean="0"/>
+              <a:t>SCOPE</a:t>
+            </a:r>
+            <a:br>
+              <a:rPr lang="de-DE" dirty="0" smtClean="0"/>
+            </a:br>
+            <a:r>
+              <a:rPr lang="en-US" dirty="0"/>
+              <a:t>Identify Possible top hits based on song features</a:t>
+            </a:r>
+            <a:br>
+              <a:rPr lang="en-US" dirty="0"/>
+            </a:br>
+            <a:endParaRPr lang="de-DE" dirty="0"/>
+          </a:p>
+        </p:txBody>
+      </p:sp>
+      <p:sp>
+        <p:nvSpPr>
+          <p:cNvPr id="3" name="Inhaltsplatzhalter 2"/>
+          <p:cNvSpPr>
+            <a:spLocks noGrp="1"/>
+          </p:cNvSpPr>
+          <p:nvPr>
+            <p:ph idx="1"/>
+          </p:nvPr>
+        </p:nvSpPr>
+        <p:spPr/>
+        <p:txBody>
+          <a:bodyPr>
+            <a:normAutofit/>
+          </a:bodyPr>
+          <a:lstStyle/>
+          <a:p>
+            <a:r>
+              <a:rPr lang="en-US" b="1" dirty="0"/>
+              <a:t>Background</a:t>
+            </a:r>
+            <a:r>
+              <a:rPr lang="en-US" b="1" dirty="0" smtClean="0"/>
+              <a:t>: </a:t>
+            </a:r>
+            <a:r>
+              <a:rPr lang="en-US" dirty="0" smtClean="0"/>
+              <a:t>Traditionally the music industry has </a:t>
+            </a:r>
+            <a:r>
+              <a:rPr lang="en-US" dirty="0"/>
+              <a:t>relied on gut feelings and intuition to identify potential hits, but </a:t>
+            </a:r>
+            <a:r>
+              <a:rPr lang="en-US" dirty="0" smtClean="0"/>
+              <a:t>now </a:t>
+            </a:r>
+            <a:r>
+              <a:rPr lang="en-US" dirty="0"/>
+              <a:t>data science techniques can </a:t>
+            </a:r>
+            <a:r>
+              <a:rPr lang="en-US" dirty="0" smtClean="0"/>
+              <a:t>be </a:t>
+            </a:r>
+            <a:r>
+              <a:rPr lang="en-US" dirty="0"/>
+              <a:t>used to analyze song features and predict which songs are most likely to become </a:t>
+            </a:r>
+            <a:r>
+              <a:rPr lang="en-US" dirty="0" smtClean="0"/>
+              <a:t>popular/top hit.</a:t>
+            </a:r>
+            <a:endParaRPr lang="en-US" dirty="0"/>
+          </a:p>
+          <a:p>
+            <a:r>
+              <a:rPr lang="en-US" b="1" dirty="0" smtClean="0"/>
+              <a:t>Objectives:</a:t>
+            </a:r>
+            <a:r>
+              <a:rPr lang="en-US" dirty="0"/>
+              <a:t> By analyzing the song features such as tempo, </a:t>
+            </a:r>
+            <a:r>
+              <a:rPr lang="en-US" dirty="0" err="1"/>
+              <a:t>danceability</a:t>
+            </a:r>
+            <a:r>
+              <a:rPr lang="en-US" dirty="0"/>
+              <a:t>, energy, and others, we aim to understand the characteristics that make a song </a:t>
+            </a:r>
+            <a:r>
+              <a:rPr lang="en-US" dirty="0" smtClean="0"/>
+              <a:t>popular. </a:t>
+            </a:r>
+            <a:r>
+              <a:rPr lang="en-US" dirty="0"/>
+              <a:t>This information can be useful for music streaming platforms, record labels, and artists to make informed decisions about their music releases and marketing strategies</a:t>
+            </a:r>
+            <a:r>
+              <a:rPr lang="en-US" dirty="0" smtClean="0"/>
+              <a:t>.</a:t>
+            </a:r>
+          </a:p>
+          <a:p>
+            <a:r>
+              <a:rPr lang="en-US" b="1" dirty="0"/>
+              <a:t>Model evaluation:</a:t>
+            </a:r>
+            <a:r>
+              <a:rPr lang="en-US" dirty="0"/>
+              <a:t> We will compare different models regarding accuracy, precision, recall. </a:t>
+            </a:r>
+          </a:p>
+          <a:p>
+            <a:pPr lvl="1">
+              <a:buFont typeface="Wingdings" panose="05000000000000000000" pitchFamily="2" charset="2"/>
+              <a:buChar char="Ø"/>
+            </a:pPr>
+            <a:endParaRPr lang="en-US" dirty="0"/>
+          </a:p>
+        </p:txBody>
+      </p:sp>
+    </p:spTree>
+    <p:extLst>
+      <p:ext uri="{BB962C8B-B14F-4D97-AF65-F5344CB8AC3E}">
+        <p14:creationId xmlns:p14="http://schemas.microsoft.com/office/powerpoint/2010/main" val="2940838240"/>
+      </p:ext>
+    </p:extLst>
+  </p:cSld>
+  <p:clrMapOvr>
+    <a:masterClrMapping/>
+  </p:clrMapOvr>
+</p:sld>
+</file>
+
+<file path=ppt/slides/slide4.xml><?xml version="1.0" encoding="utf-8"?>
+<p:sld xmlns:a="http://schemas.openxmlformats.org/drawingml/2006/main" xmlns:r="http://schemas.openxmlformats.org/officeDocument/2006/relationships" xmlns:p="http://schemas.openxmlformats.org/presentationml/2006/main">
+  <p:cSld>
+    <p:spTree>
+      <p:nvGrpSpPr>
+        <p:cNvPr id="1" name=""/>
+        <p:cNvGrpSpPr/>
+        <p:nvPr/>
+      </p:nvGrpSpPr>
+      <p:grpSpPr>
+        <a:xfrm>
+          <a:off x="0" y="0"/>
+          <a:ext cx="0" cy="0"/>
+          <a:chOff x="0" y="0"/>
+          <a:chExt cx="0" cy="0"/>
+        </a:xfrm>
+      </p:grpSpPr>
+      <p:sp>
+        <p:nvSpPr>
+          <p:cNvPr id="2" name="Titel 1"/>
+          <p:cNvSpPr>
+            <a:spLocks noGrp="1"/>
+          </p:cNvSpPr>
+          <p:nvPr>
+            <p:ph type="title"/>
+          </p:nvPr>
+        </p:nvSpPr>
+        <p:spPr/>
+        <p:txBody>
+          <a:bodyPr anchor="ctr">
+            <a:normAutofit fontScale="90000"/>
+          </a:bodyPr>
+          <a:lstStyle/>
+          <a:p>
+            <a:r>
+              <a:rPr lang="de-DE" dirty="0" smtClean="0"/>
+              <a:t/>
+            </a:r>
+            <a:br>
+              <a:rPr lang="de-DE" dirty="0" smtClean="0"/>
+            </a:br>
+            <a:r>
+              <a:rPr lang="de-DE" dirty="0"/>
+              <a:t/>
+            </a:r>
+            <a:br>
+              <a:rPr lang="de-DE" dirty="0"/>
+            </a:br>
+            <a:r>
+              <a:rPr lang="de-DE" dirty="0" smtClean="0"/>
+              <a:t>SCOPE</a:t>
+            </a:r>
+            <a:br>
+              <a:rPr lang="de-DE" dirty="0" smtClean="0"/>
+            </a:br>
+            <a:r>
+              <a:rPr lang="en-US" dirty="0"/>
+              <a:t>Identify Possible top hits based on song features</a:t>
+            </a:r>
+            <a:br>
+              <a:rPr lang="en-US" dirty="0"/>
+            </a:br>
+            <a:endParaRPr lang="de-DE" dirty="0"/>
+          </a:p>
+        </p:txBody>
+      </p:sp>
+      <p:sp>
+        <p:nvSpPr>
+          <p:cNvPr id="3" name="Inhaltsplatzhalter 2"/>
+          <p:cNvSpPr>
+            <a:spLocks noGrp="1"/>
+          </p:cNvSpPr>
+          <p:nvPr>
+            <p:ph idx="1"/>
+          </p:nvPr>
+        </p:nvSpPr>
+        <p:spPr>
+          <a:xfrm>
+            <a:off x="581192" y="2005176"/>
+            <a:ext cx="11029615" cy="3634486"/>
+          </a:xfrm>
+        </p:spPr>
+        <p:txBody>
+          <a:bodyPr>
+            <a:normAutofit/>
+          </a:bodyPr>
+          <a:lstStyle/>
+          <a:p>
+            <a:r>
+              <a:rPr lang="en-US" b="1" dirty="0" smtClean="0"/>
+              <a:t>Data sources:</a:t>
+            </a:r>
+            <a:r>
+              <a:rPr lang="en-US" dirty="0"/>
+              <a:t> </a:t>
+            </a:r>
+            <a:r>
+              <a:rPr lang="en-US" dirty="0" smtClean="0"/>
+              <a:t>we used four </a:t>
+            </a:r>
+            <a:r>
+              <a:rPr lang="en-US" dirty="0"/>
+              <a:t>Spotify datasets provided by </a:t>
+            </a:r>
+            <a:r>
+              <a:rPr lang="en-US" dirty="0" err="1"/>
+              <a:t>Kaggle</a:t>
+            </a:r>
+            <a:r>
+              <a:rPr lang="en-US" dirty="0"/>
+              <a:t>. The datasets </a:t>
+            </a:r>
+            <a:r>
+              <a:rPr lang="en-US" dirty="0" smtClean="0"/>
+              <a:t>are:</a:t>
+            </a:r>
+          </a:p>
+          <a:p>
+            <a:pPr lvl="1">
+              <a:buFont typeface="Wingdings" panose="05000000000000000000" pitchFamily="2" charset="2"/>
+              <a:buChar char="Ø"/>
+            </a:pPr>
+            <a:r>
+              <a:rPr lang="en-US" dirty="0" smtClean="0"/>
+              <a:t>3 data sets of the “Spotify </a:t>
+            </a:r>
+            <a:r>
+              <a:rPr lang="en-US" dirty="0"/>
+              <a:t>Dataset 1921-2020, 600k+ </a:t>
+            </a:r>
+            <a:r>
+              <a:rPr lang="en-US" dirty="0" smtClean="0"/>
+              <a:t>Tracks” </a:t>
+            </a:r>
+          </a:p>
+          <a:p>
+            <a:pPr lvl="2">
+              <a:buFont typeface="Wingdings" panose="05000000000000000000" pitchFamily="2" charset="2"/>
+              <a:buChar char="Ø"/>
+            </a:pPr>
+            <a:r>
+              <a:rPr lang="en-US" dirty="0">
+                <a:sym typeface="Wingdings" panose="05000000000000000000" pitchFamily="2" charset="2"/>
+              </a:rPr>
+              <a:t>artists.csv </a:t>
+            </a:r>
+            <a:r>
+              <a:rPr lang="en-US" dirty="0" smtClean="0">
+                <a:sym typeface="Wingdings" panose="05000000000000000000" pitchFamily="2" charset="2"/>
+              </a:rPr>
+              <a:t> </a:t>
+            </a:r>
+            <a:r>
+              <a:rPr lang="en-US" dirty="0">
+                <a:sym typeface="Wingdings" panose="05000000000000000000" pitchFamily="2" charset="2"/>
+              </a:rPr>
+              <a:t>Artist f</a:t>
+            </a:r>
+            <a:r>
+              <a:rPr lang="en-US" dirty="0" smtClean="0">
+                <a:sym typeface="Wingdings" panose="05000000000000000000" pitchFamily="2" charset="2"/>
+              </a:rPr>
+              <a:t>eatures </a:t>
+            </a:r>
+            <a:r>
+              <a:rPr lang="en-US" dirty="0">
+                <a:sym typeface="Wingdings" panose="05000000000000000000" pitchFamily="2" charset="2"/>
+              </a:rPr>
+              <a:t>like Popularity, Followers etc.</a:t>
+            </a:r>
+          </a:p>
+          <a:p>
+            <a:pPr lvl="2">
+              <a:buFont typeface="Wingdings" panose="05000000000000000000" pitchFamily="2" charset="2"/>
+              <a:buChar char="Ø"/>
+            </a:pPr>
+            <a:r>
+              <a:rPr lang="en-US" dirty="0" err="1">
+                <a:sym typeface="Wingdings" panose="05000000000000000000" pitchFamily="2" charset="2"/>
+              </a:rPr>
+              <a:t>dict_artists.json</a:t>
+            </a:r>
+            <a:r>
+              <a:rPr lang="en-US" dirty="0">
+                <a:sym typeface="Wingdings" panose="05000000000000000000" pitchFamily="2" charset="2"/>
+              </a:rPr>
+              <a:t> </a:t>
+            </a:r>
+            <a:r>
+              <a:rPr lang="en-US" dirty="0" smtClean="0">
+                <a:sym typeface="Wingdings" panose="05000000000000000000" pitchFamily="2" charset="2"/>
+              </a:rPr>
+              <a:t> </a:t>
+            </a:r>
+            <a:r>
+              <a:rPr lang="en-US" dirty="0">
+                <a:sym typeface="Wingdings" panose="05000000000000000000" pitchFamily="2" charset="2"/>
+              </a:rPr>
+              <a:t>The artists recommended for fans of artists. </a:t>
+            </a:r>
+            <a:endParaRPr lang="en-US" dirty="0" smtClean="0">
+              <a:sym typeface="Wingdings" panose="05000000000000000000" pitchFamily="2" charset="2"/>
+            </a:endParaRPr>
+          </a:p>
+          <a:p>
+            <a:pPr lvl="2">
+              <a:buFont typeface="Wingdings" panose="05000000000000000000" pitchFamily="2" charset="2"/>
+              <a:buChar char="Ø"/>
+            </a:pPr>
+            <a:r>
+              <a:rPr lang="en-US" dirty="0" smtClean="0">
+                <a:sym typeface="Wingdings" panose="05000000000000000000" pitchFamily="2" charset="2"/>
+              </a:rPr>
+              <a:t>tracks.csv  The </a:t>
+            </a:r>
+            <a:r>
+              <a:rPr lang="en-US" dirty="0">
+                <a:sym typeface="Wingdings" panose="05000000000000000000" pitchFamily="2" charset="2"/>
+              </a:rPr>
+              <a:t>audio features of tracks</a:t>
+            </a:r>
+            <a:r>
+              <a:rPr lang="en-US" dirty="0" smtClean="0">
+                <a:sym typeface="Wingdings" panose="05000000000000000000" pitchFamily="2" charset="2"/>
+              </a:rPr>
+              <a:t>.</a:t>
+            </a:r>
+          </a:p>
+          <a:p>
+            <a:pPr lvl="1">
+              <a:buFont typeface="Wingdings" panose="05000000000000000000" pitchFamily="2" charset="2"/>
+              <a:buChar char="Ø"/>
+            </a:pPr>
+            <a:r>
+              <a:rPr lang="en-US" dirty="0">
+                <a:sym typeface="Wingdings" panose="05000000000000000000" pitchFamily="2" charset="2"/>
+              </a:rPr>
+              <a:t>1 data set of “Spotify tracks chart dataset (2014-2022</a:t>
+            </a:r>
+            <a:r>
+              <a:rPr lang="en-US" dirty="0" smtClean="0">
+                <a:sym typeface="Wingdings" panose="05000000000000000000" pitchFamily="2" charset="2"/>
+              </a:rPr>
+              <a:t>)”</a:t>
+            </a:r>
+          </a:p>
+          <a:p>
+            <a:pPr lvl="2">
+              <a:buFont typeface="Wingdings" panose="05000000000000000000" pitchFamily="2" charset="2"/>
+              <a:buChar char="Ø"/>
+            </a:pPr>
+            <a:r>
+              <a:rPr lang="en-US" dirty="0" smtClean="0">
+                <a:sym typeface="Wingdings" panose="05000000000000000000" pitchFamily="2" charset="2"/>
+              </a:rPr>
+              <a:t>charts.csv  This </a:t>
+            </a:r>
+            <a:r>
+              <a:rPr lang="en-US" dirty="0">
+                <a:sym typeface="Wingdings" panose="05000000000000000000" pitchFamily="2" charset="2"/>
+              </a:rPr>
+              <a:t>dataset is comprised of weekly Spotify track chart data from 2014 to </a:t>
+            </a:r>
+            <a:r>
+              <a:rPr lang="en-US" dirty="0" smtClean="0">
+                <a:sym typeface="Wingdings" panose="05000000000000000000" pitchFamily="2" charset="2"/>
+              </a:rPr>
+              <a:t>2022. Used </a:t>
+            </a:r>
+            <a:r>
+              <a:rPr lang="en-US" dirty="0">
+                <a:sym typeface="Wingdings" panose="05000000000000000000" pitchFamily="2" charset="2"/>
+              </a:rPr>
+              <a:t>to get the chart position of the song in various countries.</a:t>
+            </a:r>
+          </a:p>
+          <a:p>
+            <a:pPr lvl="1">
+              <a:buFont typeface="Wingdings" panose="05000000000000000000" pitchFamily="2" charset="2"/>
+              <a:buChar char="Ø"/>
+            </a:pPr>
+            <a:endParaRPr lang="en-US" dirty="0"/>
+          </a:p>
+        </p:txBody>
+      </p:sp>
+    </p:spTree>
+    <p:extLst>
+      <p:ext uri="{BB962C8B-B14F-4D97-AF65-F5344CB8AC3E}">
+        <p14:creationId xmlns:p14="http://schemas.microsoft.com/office/powerpoint/2010/main" val="2725806563"/>
+      </p:ext>
+    </p:extLst>
+  </p:cSld>
+  <p:clrMapOvr>
+    <a:masterClrMapping/>
+  </p:clrMapOvr>
+  <p:timing>
+    <p:tnLst>
+      <p:par>
+        <p:cTn id="1" dur="indefinite" restart="never" nodeType="tmRoot"/>
+      </p:par>
+    </p:tnLst>
+  </p:timing>
+</p:sld>
+</file>
+
+<file path=ppt/slides/slide5.xml><?xml version="1.0" encoding="utf-8"?>
 <p:sld xmlns:a="http://schemas.openxmlformats.org/drawingml/2006/main" xmlns:r="http://schemas.openxmlformats.org/officeDocument/2006/relationships" xmlns:p="http://schemas.openxmlformats.org/presentationml/2006/main">
   <p:cSld>
     <p:spTree>
@@ -7951,7 +11252,7 @@
 </p:sld>
 </file>
 
-<file path=ppt/slides/slide4.xml><?xml version="1.0" encoding="utf-8"?>
+<file path=ppt/slides/slide6.xml><?xml version="1.0" encoding="utf-8"?>
 <p:sld xmlns:a="http://schemas.openxmlformats.org/drawingml/2006/main" xmlns:r="http://schemas.openxmlformats.org/officeDocument/2006/relationships" xmlns:p="http://schemas.openxmlformats.org/presentationml/2006/main">
   <p:cSld>
     <p:bg>
@@ -7984,7 +11285,7 @@
                 <a16:creationId xmlns:a16="http://schemas.microsoft.com/office/drawing/2014/main" id="{E6C8E6EB-4C59-429B-97E4-72A058CFC4FB}"/>
               </a:ext>
               <a:ext uri="{C183D7F6-B498-43B3-948B-1728B52AA6E4}">
-                <adec:decorative xmlns:adec="http://schemas.microsoft.com/office/drawing/2017/decorative" val="1"/>
+                <adec:decorative xmlns:adec="http://schemas.microsoft.com/office/drawing/2017/decorative" xmlns="" val="1"/>
               </a:ext>
             </a:extLst>
           </p:cNvPr>
@@ -8038,7 +11339,7 @@
                 <a16:creationId xmlns:a16="http://schemas.microsoft.com/office/drawing/2014/main" id="{B5B90362-AFCC-46A9-B41C-A257A8C5B314}"/>
               </a:ext>
               <a:ext uri="{C183D7F6-B498-43B3-948B-1728B52AA6E4}">
-                <adec:decorative xmlns:adec="http://schemas.microsoft.com/office/drawing/2017/decorative" val="1"/>
+                <adec:decorative xmlns:adec="http://schemas.microsoft.com/office/drawing/2017/decorative" xmlns="" val="1"/>
               </a:ext>
             </a:extLst>
           </p:cNvPr>
@@ -8092,7 +11393,7 @@
                 <a16:creationId xmlns:a16="http://schemas.microsoft.com/office/drawing/2014/main" id="{F71EF7F1-38BA-471D-8CD4-2A9AE8E35527}"/>
               </a:ext>
               <a:ext uri="{C183D7F6-B498-43B3-948B-1728B52AA6E4}">
-                <adec:decorative xmlns:adec="http://schemas.microsoft.com/office/drawing/2017/decorative" val="1"/>
+                <adec:decorative xmlns:adec="http://schemas.microsoft.com/office/drawing/2017/decorative" xmlns="" val="1"/>
               </a:ext>
             </a:extLst>
           </p:cNvPr>
@@ -8146,7 +11447,7 @@
                 <a16:creationId xmlns:a16="http://schemas.microsoft.com/office/drawing/2014/main" id="{3CED7894-4F62-4A6C-8DB5-DB5BE08E9C03}"/>
               </a:ext>
               <a:ext uri="{C183D7F6-B498-43B3-948B-1728B52AA6E4}">
-                <adec:decorative xmlns:adec="http://schemas.microsoft.com/office/drawing/2017/decorative" val="1"/>
+                <adec:decorative xmlns:adec="http://schemas.microsoft.com/office/drawing/2017/decorative" xmlns="" val="1"/>
               </a:ext>
             </a:extLst>
           </p:cNvPr>
@@ -8295,7 +11596,7 @@
                 <a16:creationId xmlns:a16="http://schemas.microsoft.com/office/drawing/2014/main" id="{E536F3B4-50F6-4C52-8F76-4EB1214719DC}"/>
               </a:ext>
               <a:ext uri="{C183D7F6-B498-43B3-948B-1728B52AA6E4}">
-                <adec:decorative xmlns:adec="http://schemas.microsoft.com/office/drawing/2017/decorative" val="1"/>
+                <adec:decorative xmlns:adec="http://schemas.microsoft.com/office/drawing/2017/decorative" xmlns="" val="1"/>
               </a:ext>
             </a:extLst>
           </p:cNvPr>
@@ -8468,7 +11769,7 @@
 </p:sld>
 </file>
 
-<file path=ppt/slides/slide5.xml><?xml version="1.0" encoding="utf-8"?>
+<file path=ppt/slides/slide7.xml><?xml version="1.0" encoding="utf-8"?>
 <p:sld xmlns:a="http://schemas.openxmlformats.org/drawingml/2006/main" xmlns:r="http://schemas.openxmlformats.org/officeDocument/2006/relationships" xmlns:p="http://schemas.openxmlformats.org/presentationml/2006/main">
   <p:cSld>
     <p:bg>
@@ -8501,7 +11802,7 @@
                 <a16:creationId xmlns:a16="http://schemas.microsoft.com/office/drawing/2014/main" id="{3CED7894-4F62-4A6C-8DB5-DB5BE08E9C03}"/>
               </a:ext>
               <a:ext uri="{C183D7F6-B498-43B3-948B-1728B52AA6E4}">
-                <adec:decorative xmlns:adec="http://schemas.microsoft.com/office/drawing/2017/decorative" val="1"/>
+                <adec:decorative xmlns:adec="http://schemas.microsoft.com/office/drawing/2017/decorative" xmlns="" val="1"/>
               </a:ext>
             </a:extLst>
           </p:cNvPr>
@@ -8598,7 +11899,7 @@
                 <a16:creationId xmlns:a16="http://schemas.microsoft.com/office/drawing/2014/main" id="{E536F3B4-50F6-4C52-8F76-4EB1214719DC}"/>
               </a:ext>
               <a:ext uri="{C183D7F6-B498-43B3-948B-1728B52AA6E4}">
-                <adec:decorative xmlns:adec="http://schemas.microsoft.com/office/drawing/2017/decorative" val="1"/>
+                <adec:decorative xmlns:adec="http://schemas.microsoft.com/office/drawing/2017/decorative" xmlns="" val="1"/>
               </a:ext>
             </a:extLst>
           </p:cNvPr>
@@ -9503,7 +12804,7 @@
 </p:sld>
 </file>
 
-<file path=ppt/slides/slide6.xml><?xml version="1.0" encoding="utf-8"?>
+<file path=ppt/slides/slide8.xml><?xml version="1.0" encoding="utf-8"?>
 <p:sld xmlns:a="http://schemas.openxmlformats.org/drawingml/2006/main" xmlns:r="http://schemas.openxmlformats.org/officeDocument/2006/relationships" xmlns:p="http://schemas.openxmlformats.org/presentationml/2006/main">
   <p:cSld>
     <p:bg>
@@ -9536,7 +12837,7 @@
                 <a16:creationId xmlns:a16="http://schemas.microsoft.com/office/drawing/2014/main" id="{3CED7894-4F62-4A6C-8DB5-DB5BE08E9C03}"/>
               </a:ext>
               <a:ext uri="{C183D7F6-B498-43B3-948B-1728B52AA6E4}">
-                <adec:decorative xmlns:adec="http://schemas.microsoft.com/office/drawing/2017/decorative" val="1"/>
+                <adec:decorative xmlns:adec="http://schemas.microsoft.com/office/drawing/2017/decorative" xmlns="" val="1"/>
               </a:ext>
             </a:extLst>
           </p:cNvPr>
@@ -9685,7 +12986,7 @@
                 <a16:creationId xmlns:a16="http://schemas.microsoft.com/office/drawing/2014/main" id="{E536F3B4-50F6-4C52-8F76-4EB1214719DC}"/>
               </a:ext>
               <a:ext uri="{C183D7F6-B498-43B3-948B-1728B52AA6E4}">
-                <adec:decorative xmlns:adec="http://schemas.microsoft.com/office/drawing/2017/decorative" val="1"/>
+                <adec:decorative xmlns:adec="http://schemas.microsoft.com/office/drawing/2017/decorative" xmlns="" val="1"/>
               </a:ext>
             </a:extLst>
           </p:cNvPr>
@@ -10066,7 +13367,7 @@
 </p:sld>
 </file>
 
-<file path=ppt/slides/slide7.xml><?xml version="1.0" encoding="utf-8"?>
+<file path=ppt/slides/slide9.xml><?xml version="1.0" encoding="utf-8"?>
 <p:sld xmlns:a="http://schemas.openxmlformats.org/drawingml/2006/main" xmlns:r="http://schemas.openxmlformats.org/officeDocument/2006/relationships" xmlns:p="http://schemas.openxmlformats.org/presentationml/2006/main" show="0">
   <p:cSld>
     <p:bg>
@@ -10099,7 +13400,7 @@
                 <a16:creationId xmlns:a16="http://schemas.microsoft.com/office/drawing/2014/main" id="{3CED7894-4F62-4A6C-8DB5-DB5BE08E9C03}"/>
               </a:ext>
               <a:ext uri="{C183D7F6-B498-43B3-948B-1728B52AA6E4}">
-                <adec:decorative xmlns:adec="http://schemas.microsoft.com/office/drawing/2017/decorative" val="1"/>
+                <adec:decorative xmlns:adec="http://schemas.microsoft.com/office/drawing/2017/decorative" xmlns="" val="1"/>
               </a:ext>
             </a:extLst>
           </p:cNvPr>
@@ -10196,7 +13497,7 @@
                 <a16:creationId xmlns:a16="http://schemas.microsoft.com/office/drawing/2014/main" id="{E536F3B4-50F6-4C52-8F76-4EB1214719DC}"/>
               </a:ext>
               <a:ext uri="{C183D7F6-B498-43B3-948B-1728B52AA6E4}">
-                <adec:decorative xmlns:adec="http://schemas.microsoft.com/office/drawing/2017/decorative" val="1"/>
+                <adec:decorative xmlns:adec="http://schemas.microsoft.com/office/drawing/2017/decorative" xmlns="" val="1"/>
               </a:ext>
             </a:extLst>
           </p:cNvPr>
@@ -10803,186 +14104,14 @@
   <p:clrMapOvr>
     <a:masterClrMapping/>
   </p:clrMapOvr>
-</p:sld>
-</file>
-
-<file path=ppt/slides/slide8.xml><?xml version="1.0" encoding="utf-8"?>
-<p:sld xmlns:a="http://schemas.openxmlformats.org/drawingml/2006/main" xmlns:r="http://schemas.openxmlformats.org/officeDocument/2006/relationships" xmlns:p="http://schemas.openxmlformats.org/presentationml/2006/main">
-  <p:cSld>
-    <p:spTree>
-      <p:nvGrpSpPr>
-        <p:cNvPr id="1" name=""/>
-        <p:cNvGrpSpPr/>
-        <p:nvPr/>
-      </p:nvGrpSpPr>
-      <p:grpSpPr>
-        <a:xfrm>
-          <a:off x="0" y="0"/>
-          <a:ext cx="0" cy="0"/>
-          <a:chOff x="0" y="0"/>
-          <a:chExt cx="0" cy="0"/>
-        </a:xfrm>
-      </p:grpSpPr>
-      <p:sp>
-        <p:nvSpPr>
-          <p:cNvPr id="2" name="Titel 1">
-            <a:extLst>
-              <a:ext uri="{FF2B5EF4-FFF2-40B4-BE49-F238E27FC236}">
-                <a16:creationId xmlns:a16="http://schemas.microsoft.com/office/drawing/2014/main" id="{06158C18-B0AD-4A23-BB2F-A981A9ADFAF7}"/>
-              </a:ext>
-            </a:extLst>
-          </p:cNvPr>
-          <p:cNvSpPr>
-            <a:spLocks noGrp="1"/>
-          </p:cNvSpPr>
-          <p:nvPr>
-            <p:ph type="title"/>
-          </p:nvPr>
-        </p:nvSpPr>
-        <p:spPr/>
-        <p:txBody>
-          <a:bodyPr/>
-          <a:lstStyle/>
-          <a:p>
-            <a:r>
-              <a:rPr lang="en-US" dirty="0"/>
-              <a:t>FP Growth – Imbalanced Attributes</a:t>
-            </a:r>
-          </a:p>
-        </p:txBody>
-      </p:sp>
-      <p:pic>
-        <p:nvPicPr>
-          <p:cNvPr id="3" name="Inhaltsplatzhalter 2">
-            <a:extLst>
-              <a:ext uri="{FF2B5EF4-FFF2-40B4-BE49-F238E27FC236}">
-                <a16:creationId xmlns:a16="http://schemas.microsoft.com/office/drawing/2014/main" id="{FB6AFB61-787C-45EC-9B7A-E62800ED1BE5}"/>
-              </a:ext>
-            </a:extLst>
-          </p:cNvPr>
-          <p:cNvPicPr>
-            <a:picLocks noGrp="1" noChangeAspect="1"/>
-          </p:cNvPicPr>
-          <p:nvPr>
-            <p:ph idx="1"/>
-          </p:nvPr>
-        </p:nvPicPr>
-        <p:blipFill>
-          <a:blip r:embed="rId2"/>
-          <a:stretch>
-            <a:fillRect/>
-          </a:stretch>
-        </p:blipFill>
-        <p:spPr>
-          <a:xfrm>
-            <a:off x="3217369" y="1890876"/>
-            <a:ext cx="5757262" cy="4837996"/>
-          </a:xfrm>
-          <a:prstGeom prst="rect">
-            <a:avLst/>
-          </a:prstGeom>
-        </p:spPr>
-      </p:pic>
-    </p:spTree>
-    <p:extLst>
-      <p:ext uri="{BB962C8B-B14F-4D97-AF65-F5344CB8AC3E}">
-        <p14:creationId xmlns:p14="http://schemas.microsoft.com/office/powerpoint/2010/main" val="3385513302"/>
-      </p:ext>
-    </p:extLst>
-  </p:cSld>
-  <p:clrMapOvr>
-    <a:masterClrMapping/>
-  </p:clrMapOvr>
-</p:sld>
-</file>
-
-<file path=ppt/slides/slide9.xml><?xml version="1.0" encoding="utf-8"?>
-<p:sld xmlns:a="http://schemas.openxmlformats.org/drawingml/2006/main" xmlns:r="http://schemas.openxmlformats.org/officeDocument/2006/relationships" xmlns:p="http://schemas.openxmlformats.org/presentationml/2006/main">
-  <p:cSld>
-    <p:spTree>
-      <p:nvGrpSpPr>
-        <p:cNvPr id="1" name=""/>
-        <p:cNvGrpSpPr/>
-        <p:nvPr/>
-      </p:nvGrpSpPr>
-      <p:grpSpPr>
-        <a:xfrm>
-          <a:off x="0" y="0"/>
-          <a:ext cx="0" cy="0"/>
-          <a:chOff x="0" y="0"/>
-          <a:chExt cx="0" cy="0"/>
-        </a:xfrm>
-      </p:grpSpPr>
-      <p:sp>
-        <p:nvSpPr>
-          <p:cNvPr id="2" name="Titel 1">
-            <a:extLst>
-              <a:ext uri="{FF2B5EF4-FFF2-40B4-BE49-F238E27FC236}">
-                <a16:creationId xmlns:a16="http://schemas.microsoft.com/office/drawing/2014/main" id="{06158C18-B0AD-4A23-BB2F-A981A9ADFAF7}"/>
-              </a:ext>
-            </a:extLst>
-          </p:cNvPr>
-          <p:cNvSpPr>
-            <a:spLocks noGrp="1"/>
-          </p:cNvSpPr>
-          <p:nvPr>
-            <p:ph type="title"/>
-          </p:nvPr>
-        </p:nvSpPr>
-        <p:spPr/>
-        <p:txBody>
-          <a:bodyPr/>
-          <a:lstStyle/>
-          <a:p>
-            <a:r>
-              <a:rPr lang="en-US" dirty="0"/>
-              <a:t>FP Growth – Remaining Attributes</a:t>
-            </a:r>
-          </a:p>
-        </p:txBody>
-      </p:sp>
-      <p:pic>
-        <p:nvPicPr>
-          <p:cNvPr id="4" name="Inhaltsplatzhalter 3">
-            <a:extLst>
-              <a:ext uri="{FF2B5EF4-FFF2-40B4-BE49-F238E27FC236}">
-                <a16:creationId xmlns:a16="http://schemas.microsoft.com/office/drawing/2014/main" id="{293B326B-6028-4BEF-8167-4383F16F4DDF}"/>
-              </a:ext>
-            </a:extLst>
-          </p:cNvPr>
-          <p:cNvPicPr>
-            <a:picLocks noGrp="1" noChangeAspect="1"/>
-          </p:cNvPicPr>
-          <p:nvPr>
-            <p:ph idx="1"/>
-          </p:nvPr>
-        </p:nvPicPr>
-        <p:blipFill>
-          <a:blip r:embed="rId2"/>
-          <a:stretch>
-            <a:fillRect/>
-          </a:stretch>
-        </p:blipFill>
-        <p:spPr>
-          <a:xfrm>
-            <a:off x="3455234" y="1890876"/>
-            <a:ext cx="5281532" cy="4629845"/>
-          </a:xfrm>
-          <a:prstGeom prst="rect">
-            <a:avLst/>
-          </a:prstGeom>
-        </p:spPr>
-      </p:pic>
-    </p:spTree>
-    <p:extLst>
-      <p:ext uri="{BB962C8B-B14F-4D97-AF65-F5344CB8AC3E}">
-        <p14:creationId xmlns:p14="http://schemas.microsoft.com/office/powerpoint/2010/main" val="2154687140"/>
-      </p:ext>
-    </p:extLst>
-  </p:cSld>
-  <p:clrMapOvr>
-    <a:masterClrMapping/>
-  </p:clrMapOvr>
+  <mc:AlternateContent xmlns:mc="http://schemas.openxmlformats.org/markup-compatibility/2006">
+    <mc:Choice xmlns:p14="http://schemas.microsoft.com/office/powerpoint/2010/main" Requires="p14">
+      <p:transition spd="slow" p14:dur="2000"/>
+    </mc:Choice>
+    <mc:Fallback>
+      <p:transition spd="slow"/>
+    </mc:Fallback>
+  </mc:AlternateContent>
 </p:sld>
 </file>
 

</xml_diff>